<commit_message>
added 1 part of methodology
</commit_message>
<xml_diff>
--- a/figuras.pptx
+++ b/figuras.pptx
@@ -6,6 +6,8 @@
   </p:sldMasterIdLst>
   <p:sldIdLst>
     <p:sldId id="256" r:id="rId2"/>
+    <p:sldId id="257" r:id="rId3"/>
+    <p:sldId id="258" r:id="rId4"/>
   </p:sldIdLst>
   <p:sldSz cx="12192000" cy="6858000"/>
   <p:notesSz cx="6858000" cy="9144000"/>
@@ -261,7 +263,7 @@
           <a:p>
             <a:fld id="{881458AB-DBA5-4970-92AD-774BAFB43957}" type="datetimeFigureOut">
               <a:rPr lang="es-CO" smtClean="0"/>
-              <a:t>11/11/2020</a:t>
+              <a:t>14/11/2020</a:t>
             </a:fld>
             <a:endParaRPr lang="es-CO"/>
           </a:p>
@@ -461,7 +463,7 @@
           <a:p>
             <a:fld id="{881458AB-DBA5-4970-92AD-774BAFB43957}" type="datetimeFigureOut">
               <a:rPr lang="es-CO" smtClean="0"/>
-              <a:t>11/11/2020</a:t>
+              <a:t>14/11/2020</a:t>
             </a:fld>
             <a:endParaRPr lang="es-CO"/>
           </a:p>
@@ -671,7 +673,7 @@
           <a:p>
             <a:fld id="{881458AB-DBA5-4970-92AD-774BAFB43957}" type="datetimeFigureOut">
               <a:rPr lang="es-CO" smtClean="0"/>
-              <a:t>11/11/2020</a:t>
+              <a:t>14/11/2020</a:t>
             </a:fld>
             <a:endParaRPr lang="es-CO"/>
           </a:p>
@@ -871,7 +873,7 @@
           <a:p>
             <a:fld id="{881458AB-DBA5-4970-92AD-774BAFB43957}" type="datetimeFigureOut">
               <a:rPr lang="es-CO" smtClean="0"/>
-              <a:t>11/11/2020</a:t>
+              <a:t>14/11/2020</a:t>
             </a:fld>
             <a:endParaRPr lang="es-CO"/>
           </a:p>
@@ -1147,7 +1149,7 @@
           <a:p>
             <a:fld id="{881458AB-DBA5-4970-92AD-774BAFB43957}" type="datetimeFigureOut">
               <a:rPr lang="es-CO" smtClean="0"/>
-              <a:t>11/11/2020</a:t>
+              <a:t>14/11/2020</a:t>
             </a:fld>
             <a:endParaRPr lang="es-CO"/>
           </a:p>
@@ -1415,7 +1417,7 @@
           <a:p>
             <a:fld id="{881458AB-DBA5-4970-92AD-774BAFB43957}" type="datetimeFigureOut">
               <a:rPr lang="es-CO" smtClean="0"/>
-              <a:t>11/11/2020</a:t>
+              <a:t>14/11/2020</a:t>
             </a:fld>
             <a:endParaRPr lang="es-CO"/>
           </a:p>
@@ -1830,7 +1832,7 @@
           <a:p>
             <a:fld id="{881458AB-DBA5-4970-92AD-774BAFB43957}" type="datetimeFigureOut">
               <a:rPr lang="es-CO" smtClean="0"/>
-              <a:t>11/11/2020</a:t>
+              <a:t>14/11/2020</a:t>
             </a:fld>
             <a:endParaRPr lang="es-CO"/>
           </a:p>
@@ -1972,7 +1974,7 @@
           <a:p>
             <a:fld id="{881458AB-DBA5-4970-92AD-774BAFB43957}" type="datetimeFigureOut">
               <a:rPr lang="es-CO" smtClean="0"/>
-              <a:t>11/11/2020</a:t>
+              <a:t>14/11/2020</a:t>
             </a:fld>
             <a:endParaRPr lang="es-CO"/>
           </a:p>
@@ -2085,7 +2087,7 @@
           <a:p>
             <a:fld id="{881458AB-DBA5-4970-92AD-774BAFB43957}" type="datetimeFigureOut">
               <a:rPr lang="es-CO" smtClean="0"/>
-              <a:t>11/11/2020</a:t>
+              <a:t>14/11/2020</a:t>
             </a:fld>
             <a:endParaRPr lang="es-CO"/>
           </a:p>
@@ -2398,7 +2400,7 @@
           <a:p>
             <a:fld id="{881458AB-DBA5-4970-92AD-774BAFB43957}" type="datetimeFigureOut">
               <a:rPr lang="es-CO" smtClean="0"/>
-              <a:t>11/11/2020</a:t>
+              <a:t>14/11/2020</a:t>
             </a:fld>
             <a:endParaRPr lang="es-CO"/>
           </a:p>
@@ -2687,7 +2689,7 @@
           <a:p>
             <a:fld id="{881458AB-DBA5-4970-92AD-774BAFB43957}" type="datetimeFigureOut">
               <a:rPr lang="es-CO" smtClean="0"/>
-              <a:t>11/11/2020</a:t>
+              <a:t>14/11/2020</a:t>
             </a:fld>
             <a:endParaRPr lang="es-CO"/>
           </a:p>
@@ -2930,7 +2932,7 @@
           <a:p>
             <a:fld id="{881458AB-DBA5-4970-92AD-774BAFB43957}" type="datetimeFigureOut">
               <a:rPr lang="es-CO" smtClean="0"/>
-              <a:t>11/11/2020</a:t>
+              <a:t>14/11/2020</a:t>
             </a:fld>
             <a:endParaRPr lang="es-CO"/>
           </a:p>
@@ -4200,6 +4202,3533 @@
 </p:sld>
 </file>
 
+<file path=ppt/slides/slide2.xml><?xml version="1.0" encoding="utf-8"?>
+<p:sld xmlns:a="http://schemas.openxmlformats.org/drawingml/2006/main" xmlns:r="http://schemas.openxmlformats.org/officeDocument/2006/relationships" xmlns:p="http://schemas.openxmlformats.org/presentationml/2006/main">
+  <p:cSld>
+    <p:spTree>
+      <p:nvGrpSpPr>
+        <p:cNvPr id="1" name=""/>
+        <p:cNvGrpSpPr/>
+        <p:nvPr/>
+      </p:nvGrpSpPr>
+      <p:grpSpPr>
+        <a:xfrm>
+          <a:off x="0" y="0"/>
+          <a:ext cx="0" cy="0"/>
+          <a:chOff x="0" y="0"/>
+          <a:chExt cx="0" cy="0"/>
+        </a:xfrm>
+      </p:grpSpPr>
+      <p:cxnSp>
+        <p:nvCxnSpPr>
+          <p:cNvPr id="46" name="Conector recto 45">
+            <a:extLst>
+              <a:ext uri="{FF2B5EF4-FFF2-40B4-BE49-F238E27FC236}">
+                <a16:creationId xmlns:a16="http://schemas.microsoft.com/office/drawing/2014/main" id="{5B8340E1-8085-4071-9D0D-43FCE37B307E}"/>
+              </a:ext>
+            </a:extLst>
+          </p:cNvPr>
+          <p:cNvCxnSpPr>
+            <a:cxnSpLocks/>
+          </p:cNvCxnSpPr>
+          <p:nvPr/>
+        </p:nvCxnSpPr>
+        <p:spPr>
+          <a:xfrm flipH="1">
+            <a:off x="6588000" y="5511164"/>
+            <a:ext cx="4363948" cy="0"/>
+          </a:xfrm>
+          <a:prstGeom prst="line">
+            <a:avLst/>
+          </a:prstGeom>
+          <a:ln w="28575">
+            <a:solidFill>
+              <a:schemeClr val="bg2">
+                <a:lumMod val="75000"/>
+              </a:schemeClr>
+            </a:solidFill>
+          </a:ln>
+        </p:spPr>
+        <p:style>
+          <a:lnRef idx="1">
+            <a:schemeClr val="accent1"/>
+          </a:lnRef>
+          <a:fillRef idx="0">
+            <a:schemeClr val="accent1"/>
+          </a:fillRef>
+          <a:effectRef idx="0">
+            <a:schemeClr val="accent1"/>
+          </a:effectRef>
+          <a:fontRef idx="minor">
+            <a:schemeClr val="tx1"/>
+          </a:fontRef>
+        </p:style>
+      </p:cxnSp>
+      <p:cxnSp>
+        <p:nvCxnSpPr>
+          <p:cNvPr id="44" name="Conector recto 43">
+            <a:extLst>
+              <a:ext uri="{FF2B5EF4-FFF2-40B4-BE49-F238E27FC236}">
+                <a16:creationId xmlns:a16="http://schemas.microsoft.com/office/drawing/2014/main" id="{64390EA3-C721-4DCD-BFC9-3ACE1B64E660}"/>
+              </a:ext>
+            </a:extLst>
+          </p:cNvPr>
+          <p:cNvCxnSpPr>
+            <a:cxnSpLocks/>
+          </p:cNvCxnSpPr>
+          <p:nvPr/>
+        </p:nvCxnSpPr>
+        <p:spPr>
+          <a:xfrm flipH="1">
+            <a:off x="1120634" y="5032806"/>
+            <a:ext cx="4363948" cy="0"/>
+          </a:xfrm>
+          <a:prstGeom prst="line">
+            <a:avLst/>
+          </a:prstGeom>
+          <a:ln w="28575">
+            <a:solidFill>
+              <a:schemeClr val="bg2">
+                <a:lumMod val="75000"/>
+              </a:schemeClr>
+            </a:solidFill>
+          </a:ln>
+        </p:spPr>
+        <p:style>
+          <a:lnRef idx="1">
+            <a:schemeClr val="accent1"/>
+          </a:lnRef>
+          <a:fillRef idx="0">
+            <a:schemeClr val="accent1"/>
+          </a:fillRef>
+          <a:effectRef idx="0">
+            <a:schemeClr val="accent1"/>
+          </a:effectRef>
+          <a:fontRef idx="minor">
+            <a:schemeClr val="tx1"/>
+          </a:fontRef>
+        </p:style>
+      </p:cxnSp>
+      <p:sp>
+        <p:nvSpPr>
+          <p:cNvPr id="4" name="Elipse 3">
+            <a:extLst>
+              <a:ext uri="{FF2B5EF4-FFF2-40B4-BE49-F238E27FC236}">
+                <a16:creationId xmlns:a16="http://schemas.microsoft.com/office/drawing/2014/main" id="{AB0B4EAB-C11D-44A8-8662-E08C31AAE1A6}"/>
+              </a:ext>
+            </a:extLst>
+          </p:cNvPr>
+          <p:cNvSpPr/>
+          <p:nvPr/>
+        </p:nvSpPr>
+        <p:spPr>
+          <a:xfrm>
+            <a:off x="2305090" y="1063306"/>
+            <a:ext cx="2365695" cy="2365695"/>
+          </a:xfrm>
+          <a:prstGeom prst="ellipse">
+            <a:avLst/>
+          </a:prstGeom>
+          <a:gradFill flip="none" rotWithShape="1">
+            <a:gsLst>
+              <a:gs pos="51000">
+                <a:schemeClr val="accent2"/>
+              </a:gs>
+              <a:gs pos="30000">
+                <a:schemeClr val="accent4"/>
+              </a:gs>
+              <a:gs pos="0">
+                <a:schemeClr val="bg1"/>
+              </a:gs>
+              <a:gs pos="100000">
+                <a:schemeClr val="tx1"/>
+              </a:gs>
+            </a:gsLst>
+            <a:path path="circle">
+              <a:fillToRect l="50000" t="50000" r="50000" b="50000"/>
+            </a:path>
+            <a:tileRect/>
+          </a:gradFill>
+          <a:ln>
+            <a:noFill/>
+          </a:ln>
+        </p:spPr>
+        <p:style>
+          <a:lnRef idx="2">
+            <a:schemeClr val="accent1">
+              <a:shade val="50000"/>
+            </a:schemeClr>
+          </a:lnRef>
+          <a:fillRef idx="1">
+            <a:schemeClr val="accent1"/>
+          </a:fillRef>
+          <a:effectRef idx="0">
+            <a:schemeClr val="accent1"/>
+          </a:effectRef>
+          <a:fontRef idx="minor">
+            <a:schemeClr val="lt1"/>
+          </a:fontRef>
+        </p:style>
+        <p:txBody>
+          <a:bodyPr rtlCol="0" anchor="ctr"/>
+          <a:lstStyle/>
+          <a:p>
+            <a:pPr algn="ctr"/>
+            <a:endParaRPr lang="es-CO"/>
+          </a:p>
+        </p:txBody>
+      </p:sp>
+      <p:sp>
+        <p:nvSpPr>
+          <p:cNvPr id="6" name="Elipse 5">
+            <a:extLst>
+              <a:ext uri="{FF2B5EF4-FFF2-40B4-BE49-F238E27FC236}">
+                <a16:creationId xmlns:a16="http://schemas.microsoft.com/office/drawing/2014/main" id="{3EED6432-A0A7-405C-8194-4FAB34D284CB}"/>
+              </a:ext>
+            </a:extLst>
+          </p:cNvPr>
+          <p:cNvSpPr/>
+          <p:nvPr/>
+        </p:nvSpPr>
+        <p:spPr>
+          <a:xfrm>
+            <a:off x="7483893" y="1063305"/>
+            <a:ext cx="2365695" cy="2365695"/>
+          </a:xfrm>
+          <a:prstGeom prst="ellipse">
+            <a:avLst/>
+          </a:prstGeom>
+          <a:gradFill flip="none" rotWithShape="1">
+            <a:gsLst>
+              <a:gs pos="51000">
+                <a:schemeClr val="accent2"/>
+              </a:gs>
+              <a:gs pos="30000">
+                <a:schemeClr val="accent4"/>
+              </a:gs>
+              <a:gs pos="0">
+                <a:schemeClr val="bg1"/>
+              </a:gs>
+              <a:gs pos="100000">
+                <a:schemeClr val="tx1"/>
+              </a:gs>
+            </a:gsLst>
+            <a:path path="circle">
+              <a:fillToRect l="50000" t="50000" r="50000" b="50000"/>
+            </a:path>
+            <a:tileRect/>
+          </a:gradFill>
+          <a:ln>
+            <a:noFill/>
+          </a:ln>
+        </p:spPr>
+        <p:style>
+          <a:lnRef idx="2">
+            <a:schemeClr val="accent1">
+              <a:shade val="50000"/>
+            </a:schemeClr>
+          </a:lnRef>
+          <a:fillRef idx="1">
+            <a:schemeClr val="accent1"/>
+          </a:fillRef>
+          <a:effectRef idx="0">
+            <a:schemeClr val="accent1"/>
+          </a:effectRef>
+          <a:fontRef idx="minor">
+            <a:schemeClr val="lt1"/>
+          </a:fontRef>
+        </p:style>
+        <p:txBody>
+          <a:bodyPr rtlCol="0" anchor="ctr"/>
+          <a:lstStyle/>
+          <a:p>
+            <a:pPr algn="ctr"/>
+            <a:endParaRPr lang="es-CO"/>
+          </a:p>
+        </p:txBody>
+      </p:sp>
+      <p:cxnSp>
+        <p:nvCxnSpPr>
+          <p:cNvPr id="8" name="Conector recto de flecha 7">
+            <a:extLst>
+              <a:ext uri="{FF2B5EF4-FFF2-40B4-BE49-F238E27FC236}">
+                <a16:creationId xmlns:a16="http://schemas.microsoft.com/office/drawing/2014/main" id="{3765EE7F-6F97-4459-ADFA-4D4F5D7DA801}"/>
+              </a:ext>
+            </a:extLst>
+          </p:cNvPr>
+          <p:cNvCxnSpPr>
+            <a:cxnSpLocks/>
+          </p:cNvCxnSpPr>
+          <p:nvPr/>
+        </p:nvCxnSpPr>
+        <p:spPr>
+          <a:xfrm flipV="1">
+            <a:off x="1110343" y="3748725"/>
+            <a:ext cx="0" cy="1950097"/>
+          </a:xfrm>
+          <a:prstGeom prst="straightConnector1">
+            <a:avLst/>
+          </a:prstGeom>
+          <a:ln w="19050">
+            <a:solidFill>
+              <a:schemeClr val="tx1"/>
+            </a:solidFill>
+            <a:tailEnd type="triangle"/>
+          </a:ln>
+        </p:spPr>
+        <p:style>
+          <a:lnRef idx="1">
+            <a:schemeClr val="accent1"/>
+          </a:lnRef>
+          <a:fillRef idx="0">
+            <a:schemeClr val="accent1"/>
+          </a:fillRef>
+          <a:effectRef idx="0">
+            <a:schemeClr val="accent1"/>
+          </a:effectRef>
+          <a:fontRef idx="minor">
+            <a:schemeClr val="tx1"/>
+          </a:fontRef>
+        </p:style>
+      </p:cxnSp>
+      <p:cxnSp>
+        <p:nvCxnSpPr>
+          <p:cNvPr id="10" name="Conector recto de flecha 9">
+            <a:extLst>
+              <a:ext uri="{FF2B5EF4-FFF2-40B4-BE49-F238E27FC236}">
+                <a16:creationId xmlns:a16="http://schemas.microsoft.com/office/drawing/2014/main" id="{9976E571-5C33-40FD-A5FC-952272C2B780}"/>
+              </a:ext>
+            </a:extLst>
+          </p:cNvPr>
+          <p:cNvCxnSpPr/>
+          <p:nvPr/>
+        </p:nvCxnSpPr>
+        <p:spPr>
+          <a:xfrm>
+            <a:off x="1110343" y="5698822"/>
+            <a:ext cx="4469363" cy="0"/>
+          </a:xfrm>
+          <a:prstGeom prst="straightConnector1">
+            <a:avLst/>
+          </a:prstGeom>
+          <a:ln w="19050">
+            <a:solidFill>
+              <a:schemeClr val="tx1"/>
+            </a:solidFill>
+            <a:tailEnd type="triangle"/>
+          </a:ln>
+        </p:spPr>
+        <p:style>
+          <a:lnRef idx="1">
+            <a:schemeClr val="accent1"/>
+          </a:lnRef>
+          <a:fillRef idx="0">
+            <a:schemeClr val="accent1"/>
+          </a:fillRef>
+          <a:effectRef idx="0">
+            <a:schemeClr val="accent1"/>
+          </a:effectRef>
+          <a:fontRef idx="minor">
+            <a:schemeClr val="tx1"/>
+          </a:fontRef>
+        </p:style>
+      </p:cxnSp>
+      <p:cxnSp>
+        <p:nvCxnSpPr>
+          <p:cNvPr id="11" name="Conector recto de flecha 10">
+            <a:extLst>
+              <a:ext uri="{FF2B5EF4-FFF2-40B4-BE49-F238E27FC236}">
+                <a16:creationId xmlns:a16="http://schemas.microsoft.com/office/drawing/2014/main" id="{A37C5859-A5F2-49D0-BBCC-323842B13F9B}"/>
+              </a:ext>
+            </a:extLst>
+          </p:cNvPr>
+          <p:cNvCxnSpPr>
+            <a:cxnSpLocks/>
+          </p:cNvCxnSpPr>
+          <p:nvPr/>
+        </p:nvCxnSpPr>
+        <p:spPr>
+          <a:xfrm flipV="1">
+            <a:off x="6599853" y="3748725"/>
+            <a:ext cx="0" cy="1950097"/>
+          </a:xfrm>
+          <a:prstGeom prst="straightConnector1">
+            <a:avLst/>
+          </a:prstGeom>
+          <a:ln w="19050">
+            <a:solidFill>
+              <a:schemeClr val="tx1"/>
+            </a:solidFill>
+            <a:tailEnd type="triangle"/>
+          </a:ln>
+        </p:spPr>
+        <p:style>
+          <a:lnRef idx="1">
+            <a:schemeClr val="accent1"/>
+          </a:lnRef>
+          <a:fillRef idx="0">
+            <a:schemeClr val="accent1"/>
+          </a:fillRef>
+          <a:effectRef idx="0">
+            <a:schemeClr val="accent1"/>
+          </a:effectRef>
+          <a:fontRef idx="minor">
+            <a:schemeClr val="tx1"/>
+          </a:fontRef>
+        </p:style>
+      </p:cxnSp>
+      <p:cxnSp>
+        <p:nvCxnSpPr>
+          <p:cNvPr id="12" name="Conector recto de flecha 11">
+            <a:extLst>
+              <a:ext uri="{FF2B5EF4-FFF2-40B4-BE49-F238E27FC236}">
+                <a16:creationId xmlns:a16="http://schemas.microsoft.com/office/drawing/2014/main" id="{9B9BEE19-2152-4C58-96C5-DDEF38ECB835}"/>
+              </a:ext>
+            </a:extLst>
+          </p:cNvPr>
+          <p:cNvCxnSpPr/>
+          <p:nvPr/>
+        </p:nvCxnSpPr>
+        <p:spPr>
+          <a:xfrm>
+            <a:off x="6599853" y="5698822"/>
+            <a:ext cx="4469363" cy="0"/>
+          </a:xfrm>
+          <a:prstGeom prst="straightConnector1">
+            <a:avLst/>
+          </a:prstGeom>
+          <a:ln w="19050">
+            <a:solidFill>
+              <a:schemeClr val="tx1"/>
+            </a:solidFill>
+            <a:tailEnd type="triangle"/>
+          </a:ln>
+        </p:spPr>
+        <p:style>
+          <a:lnRef idx="1">
+            <a:schemeClr val="accent1"/>
+          </a:lnRef>
+          <a:fillRef idx="0">
+            <a:schemeClr val="accent1"/>
+          </a:fillRef>
+          <a:effectRef idx="0">
+            <a:schemeClr val="accent1"/>
+          </a:effectRef>
+          <a:fontRef idx="minor">
+            <a:schemeClr val="tx1"/>
+          </a:fontRef>
+        </p:style>
+      </p:cxnSp>
+      <p:cxnSp>
+        <p:nvCxnSpPr>
+          <p:cNvPr id="14" name="Conector recto 13">
+            <a:extLst>
+              <a:ext uri="{FF2B5EF4-FFF2-40B4-BE49-F238E27FC236}">
+                <a16:creationId xmlns:a16="http://schemas.microsoft.com/office/drawing/2014/main" id="{B2025F43-D66A-4D57-BDF0-8A7FDFFB9343}"/>
+              </a:ext>
+            </a:extLst>
+          </p:cNvPr>
+          <p:cNvCxnSpPr>
+            <a:cxnSpLocks/>
+          </p:cNvCxnSpPr>
+          <p:nvPr/>
+        </p:nvCxnSpPr>
+        <p:spPr>
+          <a:xfrm>
+            <a:off x="1726164" y="3207548"/>
+            <a:ext cx="3666931" cy="0"/>
+          </a:xfrm>
+          <a:prstGeom prst="line">
+            <a:avLst/>
+          </a:prstGeom>
+          <a:ln w="38100">
+            <a:solidFill>
+              <a:schemeClr val="tx1">
+                <a:lumMod val="50000"/>
+                <a:lumOff val="50000"/>
+              </a:schemeClr>
+            </a:solidFill>
+            <a:prstDash val="dash"/>
+          </a:ln>
+        </p:spPr>
+        <p:style>
+          <a:lnRef idx="1">
+            <a:schemeClr val="accent1"/>
+          </a:lnRef>
+          <a:fillRef idx="0">
+            <a:schemeClr val="accent1"/>
+          </a:fillRef>
+          <a:effectRef idx="0">
+            <a:schemeClr val="accent1"/>
+          </a:effectRef>
+          <a:fontRef idx="minor">
+            <a:schemeClr val="tx1"/>
+          </a:fontRef>
+        </p:style>
+      </p:cxnSp>
+      <p:cxnSp>
+        <p:nvCxnSpPr>
+          <p:cNvPr id="17" name="Conector recto 16">
+            <a:extLst>
+              <a:ext uri="{FF2B5EF4-FFF2-40B4-BE49-F238E27FC236}">
+                <a16:creationId xmlns:a16="http://schemas.microsoft.com/office/drawing/2014/main" id="{38E52A1B-FFB3-4535-8543-7D23606A9EA4}"/>
+              </a:ext>
+            </a:extLst>
+          </p:cNvPr>
+          <p:cNvCxnSpPr>
+            <a:cxnSpLocks/>
+          </p:cNvCxnSpPr>
+          <p:nvPr/>
+        </p:nvCxnSpPr>
+        <p:spPr>
+          <a:xfrm>
+            <a:off x="6721151" y="2211940"/>
+            <a:ext cx="3666931" cy="0"/>
+          </a:xfrm>
+          <a:prstGeom prst="line">
+            <a:avLst/>
+          </a:prstGeom>
+          <a:ln w="38100">
+            <a:solidFill>
+              <a:schemeClr val="tx1">
+                <a:lumMod val="50000"/>
+                <a:lumOff val="50000"/>
+              </a:schemeClr>
+            </a:solidFill>
+            <a:prstDash val="dash"/>
+          </a:ln>
+        </p:spPr>
+        <p:style>
+          <a:lnRef idx="1">
+            <a:schemeClr val="accent1"/>
+          </a:lnRef>
+          <a:fillRef idx="0">
+            <a:schemeClr val="accent1"/>
+          </a:fillRef>
+          <a:effectRef idx="0">
+            <a:schemeClr val="accent1"/>
+          </a:effectRef>
+          <a:fontRef idx="minor">
+            <a:schemeClr val="tx1"/>
+          </a:fontRef>
+        </p:style>
+      </p:cxnSp>
+      <p:sp>
+        <p:nvSpPr>
+          <p:cNvPr id="19" name="CuadroTexto 18">
+            <a:extLst>
+              <a:ext uri="{FF2B5EF4-FFF2-40B4-BE49-F238E27FC236}">
+                <a16:creationId xmlns:a16="http://schemas.microsoft.com/office/drawing/2014/main" id="{C49CA9C4-DA00-402B-BD78-BBEBE0A47E95}"/>
+              </a:ext>
+            </a:extLst>
+          </p:cNvPr>
+          <p:cNvSpPr txBox="1"/>
+          <p:nvPr/>
+        </p:nvSpPr>
+        <p:spPr>
+          <a:xfrm>
+            <a:off x="597159" y="4056634"/>
+            <a:ext cx="184731" cy="369332"/>
+          </a:xfrm>
+          <a:prstGeom prst="rect">
+            <a:avLst/>
+          </a:prstGeom>
+          <a:noFill/>
+        </p:spPr>
+        <p:txBody>
+          <a:bodyPr wrap="none" rtlCol="0">
+            <a:spAutoFit/>
+          </a:bodyPr>
+          <a:lstStyle/>
+          <a:p>
+            <a:endParaRPr lang="es-CO" dirty="0"/>
+          </a:p>
+        </p:txBody>
+      </p:sp>
+      <p:grpSp>
+        <p:nvGrpSpPr>
+          <p:cNvPr id="25" name="Grupo 24">
+            <a:extLst>
+              <a:ext uri="{FF2B5EF4-FFF2-40B4-BE49-F238E27FC236}">
+                <a16:creationId xmlns:a16="http://schemas.microsoft.com/office/drawing/2014/main" id="{A33E74B2-813C-4149-86CC-AD90BD85DD89}"/>
+              </a:ext>
+            </a:extLst>
+          </p:cNvPr>
+          <p:cNvGrpSpPr/>
+          <p:nvPr/>
+        </p:nvGrpSpPr>
+        <p:grpSpPr>
+          <a:xfrm>
+            <a:off x="6603352" y="4048989"/>
+            <a:ext cx="4329016" cy="1462175"/>
+            <a:chOff x="720713" y="592654"/>
+            <a:chExt cx="4109034" cy="1160645"/>
+          </a:xfrm>
+        </p:grpSpPr>
+        <p:sp>
+          <p:nvSpPr>
+            <p:cNvPr id="26" name="Forma libre: forma 25">
+              <a:extLst>
+                <a:ext uri="{FF2B5EF4-FFF2-40B4-BE49-F238E27FC236}">
+                  <a16:creationId xmlns:a16="http://schemas.microsoft.com/office/drawing/2014/main" id="{03D73735-FD47-4831-AC6B-5F271AF1A4E5}"/>
+                </a:ext>
+              </a:extLst>
+            </p:cNvPr>
+            <p:cNvSpPr/>
+            <p:nvPr/>
+          </p:nvSpPr>
+          <p:spPr>
+            <a:xfrm>
+              <a:off x="720713" y="592654"/>
+              <a:ext cx="2148321" cy="1160645"/>
+            </a:xfrm>
+            <a:custGeom>
+              <a:avLst/>
+              <a:gdLst>
+                <a:gd name="connsiteX0" fmla="*/ 0 w 2013358"/>
+                <a:gd name="connsiteY0" fmla="*/ 0 h 1208015"/>
+                <a:gd name="connsiteX1" fmla="*/ 545284 w 2013358"/>
+                <a:gd name="connsiteY1" fmla="*/ 536896 h 1208015"/>
+                <a:gd name="connsiteX2" fmla="*/ 1082180 w 2013358"/>
+                <a:gd name="connsiteY2" fmla="*/ 1124125 h 1208015"/>
+                <a:gd name="connsiteX3" fmla="*/ 2013358 w 2013358"/>
+                <a:gd name="connsiteY3" fmla="*/ 1208015 h 1208015"/>
+                <a:gd name="connsiteX0" fmla="*/ 0 w 2013358"/>
+                <a:gd name="connsiteY0" fmla="*/ 0 h 1208015"/>
+                <a:gd name="connsiteX1" fmla="*/ 654341 w 2013358"/>
+                <a:gd name="connsiteY1" fmla="*/ 411061 h 1208015"/>
+                <a:gd name="connsiteX2" fmla="*/ 1082180 w 2013358"/>
+                <a:gd name="connsiteY2" fmla="*/ 1124125 h 1208015"/>
+                <a:gd name="connsiteX3" fmla="*/ 2013358 w 2013358"/>
+                <a:gd name="connsiteY3" fmla="*/ 1208015 h 1208015"/>
+                <a:gd name="connsiteX0" fmla="*/ 0 w 2013358"/>
+                <a:gd name="connsiteY0" fmla="*/ 0 h 1208015"/>
+                <a:gd name="connsiteX1" fmla="*/ 738231 w 2013358"/>
+                <a:gd name="connsiteY1" fmla="*/ 192947 h 1208015"/>
+                <a:gd name="connsiteX2" fmla="*/ 1082180 w 2013358"/>
+                <a:gd name="connsiteY2" fmla="*/ 1124125 h 1208015"/>
+                <a:gd name="connsiteX3" fmla="*/ 2013358 w 2013358"/>
+                <a:gd name="connsiteY3" fmla="*/ 1208015 h 1208015"/>
+                <a:gd name="connsiteX0" fmla="*/ 0 w 2021747"/>
+                <a:gd name="connsiteY0" fmla="*/ 0 h 1149292"/>
+                <a:gd name="connsiteX1" fmla="*/ 746620 w 2021747"/>
+                <a:gd name="connsiteY1" fmla="*/ 134224 h 1149292"/>
+                <a:gd name="connsiteX2" fmla="*/ 1090569 w 2021747"/>
+                <a:gd name="connsiteY2" fmla="*/ 1065402 h 1149292"/>
+                <a:gd name="connsiteX3" fmla="*/ 2021747 w 2021747"/>
+                <a:gd name="connsiteY3" fmla="*/ 1149292 h 1149292"/>
+                <a:gd name="connsiteX0" fmla="*/ 0 w 2021747"/>
+                <a:gd name="connsiteY0" fmla="*/ 5285 h 1154577"/>
+                <a:gd name="connsiteX1" fmla="*/ 746620 w 2021747"/>
+                <a:gd name="connsiteY1" fmla="*/ 139509 h 1154577"/>
+                <a:gd name="connsiteX2" fmla="*/ 1090569 w 2021747"/>
+                <a:gd name="connsiteY2" fmla="*/ 1070687 h 1154577"/>
+                <a:gd name="connsiteX3" fmla="*/ 2021747 w 2021747"/>
+                <a:gd name="connsiteY3" fmla="*/ 1154577 h 1154577"/>
+                <a:gd name="connsiteX0" fmla="*/ 0 w 2148321"/>
+                <a:gd name="connsiteY0" fmla="*/ 3792 h 1160645"/>
+                <a:gd name="connsiteX1" fmla="*/ 873194 w 2148321"/>
+                <a:gd name="connsiteY1" fmla="*/ 145577 h 1160645"/>
+                <a:gd name="connsiteX2" fmla="*/ 1217143 w 2148321"/>
+                <a:gd name="connsiteY2" fmla="*/ 1076755 h 1160645"/>
+                <a:gd name="connsiteX3" fmla="*/ 2148321 w 2148321"/>
+                <a:gd name="connsiteY3" fmla="*/ 1160645 h 1160645"/>
+              </a:gdLst>
+              <a:ahLst/>
+              <a:cxnLst>
+                <a:cxn ang="0">
+                  <a:pos x="connsiteX0" y="connsiteY0"/>
+                </a:cxn>
+                <a:cxn ang="0">
+                  <a:pos x="connsiteX1" y="connsiteY1"/>
+                </a:cxn>
+                <a:cxn ang="0">
+                  <a:pos x="connsiteX2" y="connsiteY2"/>
+                </a:cxn>
+                <a:cxn ang="0">
+                  <a:pos x="connsiteX3" y="connsiteY3"/>
+                </a:cxn>
+              </a:cxnLst>
+              <a:rect l="l" t="t" r="r" b="b"/>
+              <a:pathLst>
+                <a:path w="2148321" h="1160645">
+                  <a:moveTo>
+                    <a:pt x="0" y="3792"/>
+                  </a:moveTo>
+                  <a:cubicBezTo>
+                    <a:pt x="358629" y="2394"/>
+                    <a:pt x="670337" y="-33250"/>
+                    <a:pt x="873194" y="145577"/>
+                  </a:cubicBezTo>
+                  <a:cubicBezTo>
+                    <a:pt x="1076051" y="324404"/>
+                    <a:pt x="972464" y="964902"/>
+                    <a:pt x="1217143" y="1076755"/>
+                  </a:cubicBezTo>
+                  <a:cubicBezTo>
+                    <a:pt x="1461822" y="1188608"/>
+                    <a:pt x="1946985" y="1142469"/>
+                    <a:pt x="2148321" y="1160645"/>
+                  </a:cubicBezTo>
+                </a:path>
+              </a:pathLst>
+            </a:custGeom>
+            <a:noFill/>
+            <a:ln w="28575">
+              <a:solidFill>
+                <a:schemeClr val="tx1"/>
+              </a:solidFill>
+            </a:ln>
+          </p:spPr>
+          <p:style>
+            <a:lnRef idx="2">
+              <a:schemeClr val="accent1">
+                <a:shade val="50000"/>
+              </a:schemeClr>
+            </a:lnRef>
+            <a:fillRef idx="1">
+              <a:schemeClr val="accent1"/>
+            </a:fillRef>
+            <a:effectRef idx="0">
+              <a:schemeClr val="accent1"/>
+            </a:effectRef>
+            <a:fontRef idx="minor">
+              <a:schemeClr val="lt1"/>
+            </a:fontRef>
+          </p:style>
+          <p:txBody>
+            <a:bodyPr rtlCol="0" anchor="ctr"/>
+            <a:lstStyle/>
+            <a:p>
+              <a:pPr algn="ctr"/>
+              <a:endParaRPr lang="es-CO" dirty="0"/>
+            </a:p>
+          </p:txBody>
+        </p:sp>
+        <p:sp>
+          <p:nvSpPr>
+            <p:cNvPr id="27" name="Forma libre: forma 26">
+              <a:extLst>
+                <a:ext uri="{FF2B5EF4-FFF2-40B4-BE49-F238E27FC236}">
+                  <a16:creationId xmlns:a16="http://schemas.microsoft.com/office/drawing/2014/main" id="{77DADEB9-2427-4401-8157-E4829FB184C9}"/>
+                </a:ext>
+              </a:extLst>
+            </p:cNvPr>
+            <p:cNvSpPr/>
+            <p:nvPr/>
+          </p:nvSpPr>
+          <p:spPr>
+            <a:xfrm flipH="1">
+              <a:off x="2808000" y="598722"/>
+              <a:ext cx="2021747" cy="1154577"/>
+            </a:xfrm>
+            <a:custGeom>
+              <a:avLst/>
+              <a:gdLst>
+                <a:gd name="connsiteX0" fmla="*/ 0 w 2013358"/>
+                <a:gd name="connsiteY0" fmla="*/ 0 h 1208015"/>
+                <a:gd name="connsiteX1" fmla="*/ 545284 w 2013358"/>
+                <a:gd name="connsiteY1" fmla="*/ 536896 h 1208015"/>
+                <a:gd name="connsiteX2" fmla="*/ 1082180 w 2013358"/>
+                <a:gd name="connsiteY2" fmla="*/ 1124125 h 1208015"/>
+                <a:gd name="connsiteX3" fmla="*/ 2013358 w 2013358"/>
+                <a:gd name="connsiteY3" fmla="*/ 1208015 h 1208015"/>
+                <a:gd name="connsiteX0" fmla="*/ 0 w 2013358"/>
+                <a:gd name="connsiteY0" fmla="*/ 0 h 1208015"/>
+                <a:gd name="connsiteX1" fmla="*/ 654341 w 2013358"/>
+                <a:gd name="connsiteY1" fmla="*/ 411061 h 1208015"/>
+                <a:gd name="connsiteX2" fmla="*/ 1082180 w 2013358"/>
+                <a:gd name="connsiteY2" fmla="*/ 1124125 h 1208015"/>
+                <a:gd name="connsiteX3" fmla="*/ 2013358 w 2013358"/>
+                <a:gd name="connsiteY3" fmla="*/ 1208015 h 1208015"/>
+                <a:gd name="connsiteX0" fmla="*/ 0 w 2013358"/>
+                <a:gd name="connsiteY0" fmla="*/ 0 h 1208015"/>
+                <a:gd name="connsiteX1" fmla="*/ 738231 w 2013358"/>
+                <a:gd name="connsiteY1" fmla="*/ 192947 h 1208015"/>
+                <a:gd name="connsiteX2" fmla="*/ 1082180 w 2013358"/>
+                <a:gd name="connsiteY2" fmla="*/ 1124125 h 1208015"/>
+                <a:gd name="connsiteX3" fmla="*/ 2013358 w 2013358"/>
+                <a:gd name="connsiteY3" fmla="*/ 1208015 h 1208015"/>
+                <a:gd name="connsiteX0" fmla="*/ 0 w 2021747"/>
+                <a:gd name="connsiteY0" fmla="*/ 0 h 1149292"/>
+                <a:gd name="connsiteX1" fmla="*/ 746620 w 2021747"/>
+                <a:gd name="connsiteY1" fmla="*/ 134224 h 1149292"/>
+                <a:gd name="connsiteX2" fmla="*/ 1090569 w 2021747"/>
+                <a:gd name="connsiteY2" fmla="*/ 1065402 h 1149292"/>
+                <a:gd name="connsiteX3" fmla="*/ 2021747 w 2021747"/>
+                <a:gd name="connsiteY3" fmla="*/ 1149292 h 1149292"/>
+                <a:gd name="connsiteX0" fmla="*/ 0 w 2021747"/>
+                <a:gd name="connsiteY0" fmla="*/ 5285 h 1154577"/>
+                <a:gd name="connsiteX1" fmla="*/ 746620 w 2021747"/>
+                <a:gd name="connsiteY1" fmla="*/ 139509 h 1154577"/>
+                <a:gd name="connsiteX2" fmla="*/ 1090569 w 2021747"/>
+                <a:gd name="connsiteY2" fmla="*/ 1070687 h 1154577"/>
+                <a:gd name="connsiteX3" fmla="*/ 2021747 w 2021747"/>
+                <a:gd name="connsiteY3" fmla="*/ 1154577 h 1154577"/>
+              </a:gdLst>
+              <a:ahLst/>
+              <a:cxnLst>
+                <a:cxn ang="0">
+                  <a:pos x="connsiteX0" y="connsiteY0"/>
+                </a:cxn>
+                <a:cxn ang="0">
+                  <a:pos x="connsiteX1" y="connsiteY1"/>
+                </a:cxn>
+                <a:cxn ang="0">
+                  <a:pos x="connsiteX2" y="connsiteY2"/>
+                </a:cxn>
+                <a:cxn ang="0">
+                  <a:pos x="connsiteX3" y="connsiteY3"/>
+                </a:cxn>
+              </a:cxnLst>
+              <a:rect l="l" t="t" r="r" b="b"/>
+              <a:pathLst>
+                <a:path w="2021747" h="1154577">
+                  <a:moveTo>
+                    <a:pt x="0" y="5285"/>
+                  </a:moveTo>
+                  <a:cubicBezTo>
+                    <a:pt x="358629" y="3887"/>
+                    <a:pt x="564859" y="-38058"/>
+                    <a:pt x="746620" y="139509"/>
+                  </a:cubicBezTo>
+                  <a:cubicBezTo>
+                    <a:pt x="928381" y="317076"/>
+                    <a:pt x="845890" y="958834"/>
+                    <a:pt x="1090569" y="1070687"/>
+                  </a:cubicBezTo>
+                  <a:cubicBezTo>
+                    <a:pt x="1335248" y="1182540"/>
+                    <a:pt x="1820411" y="1136401"/>
+                    <a:pt x="2021747" y="1154577"/>
+                  </a:cubicBezTo>
+                </a:path>
+              </a:pathLst>
+            </a:custGeom>
+            <a:noFill/>
+            <a:ln w="28575">
+              <a:solidFill>
+                <a:schemeClr val="tx1"/>
+              </a:solidFill>
+            </a:ln>
+          </p:spPr>
+          <p:style>
+            <a:lnRef idx="2">
+              <a:schemeClr val="accent1">
+                <a:shade val="50000"/>
+              </a:schemeClr>
+            </a:lnRef>
+            <a:fillRef idx="1">
+              <a:schemeClr val="accent1"/>
+            </a:fillRef>
+            <a:effectRef idx="0">
+              <a:schemeClr val="accent1"/>
+            </a:effectRef>
+            <a:fontRef idx="minor">
+              <a:schemeClr val="lt1"/>
+            </a:fontRef>
+          </p:style>
+          <p:txBody>
+            <a:bodyPr rtlCol="0" anchor="ctr"/>
+            <a:lstStyle/>
+            <a:p>
+              <a:pPr algn="ctr"/>
+              <a:endParaRPr lang="es-CO"/>
+            </a:p>
+          </p:txBody>
+        </p:sp>
+      </p:grpSp>
+      <p:grpSp>
+        <p:nvGrpSpPr>
+          <p:cNvPr id="37" name="Grupo 36">
+            <a:extLst>
+              <a:ext uri="{FF2B5EF4-FFF2-40B4-BE49-F238E27FC236}">
+                <a16:creationId xmlns:a16="http://schemas.microsoft.com/office/drawing/2014/main" id="{B2CD855B-53B0-4D32-B0AB-003C9620A9A6}"/>
+              </a:ext>
+            </a:extLst>
+          </p:cNvPr>
+          <p:cNvGrpSpPr/>
+          <p:nvPr/>
+        </p:nvGrpSpPr>
+        <p:grpSpPr>
+          <a:xfrm>
+            <a:off x="1120634" y="4017364"/>
+            <a:ext cx="4386990" cy="1019453"/>
+            <a:chOff x="1120634" y="4017364"/>
+            <a:chExt cx="4386990" cy="1277802"/>
+          </a:xfrm>
+        </p:grpSpPr>
+        <p:sp>
+          <p:nvSpPr>
+            <p:cNvPr id="35" name="Forma libre: forma 34">
+              <a:extLst>
+                <a:ext uri="{FF2B5EF4-FFF2-40B4-BE49-F238E27FC236}">
+                  <a16:creationId xmlns:a16="http://schemas.microsoft.com/office/drawing/2014/main" id="{BD72433C-A946-4F3A-A424-0BD9F8E84032}"/>
+                </a:ext>
+              </a:extLst>
+            </p:cNvPr>
+            <p:cNvSpPr/>
+            <p:nvPr/>
+          </p:nvSpPr>
+          <p:spPr>
+            <a:xfrm>
+              <a:off x="1120634" y="4017364"/>
+              <a:ext cx="2200462" cy="1277802"/>
+            </a:xfrm>
+            <a:custGeom>
+              <a:avLst/>
+              <a:gdLst>
+                <a:gd name="connsiteX0" fmla="*/ 0 w 2013358"/>
+                <a:gd name="connsiteY0" fmla="*/ 0 h 1208015"/>
+                <a:gd name="connsiteX1" fmla="*/ 545284 w 2013358"/>
+                <a:gd name="connsiteY1" fmla="*/ 536896 h 1208015"/>
+                <a:gd name="connsiteX2" fmla="*/ 1082180 w 2013358"/>
+                <a:gd name="connsiteY2" fmla="*/ 1124125 h 1208015"/>
+                <a:gd name="connsiteX3" fmla="*/ 2013358 w 2013358"/>
+                <a:gd name="connsiteY3" fmla="*/ 1208015 h 1208015"/>
+                <a:gd name="connsiteX0" fmla="*/ 0 w 2013358"/>
+                <a:gd name="connsiteY0" fmla="*/ 0 h 1208015"/>
+                <a:gd name="connsiteX1" fmla="*/ 654341 w 2013358"/>
+                <a:gd name="connsiteY1" fmla="*/ 411061 h 1208015"/>
+                <a:gd name="connsiteX2" fmla="*/ 1082180 w 2013358"/>
+                <a:gd name="connsiteY2" fmla="*/ 1124125 h 1208015"/>
+                <a:gd name="connsiteX3" fmla="*/ 2013358 w 2013358"/>
+                <a:gd name="connsiteY3" fmla="*/ 1208015 h 1208015"/>
+                <a:gd name="connsiteX0" fmla="*/ 0 w 2013358"/>
+                <a:gd name="connsiteY0" fmla="*/ 0 h 1208015"/>
+                <a:gd name="connsiteX1" fmla="*/ 738231 w 2013358"/>
+                <a:gd name="connsiteY1" fmla="*/ 192947 h 1208015"/>
+                <a:gd name="connsiteX2" fmla="*/ 1082180 w 2013358"/>
+                <a:gd name="connsiteY2" fmla="*/ 1124125 h 1208015"/>
+                <a:gd name="connsiteX3" fmla="*/ 2013358 w 2013358"/>
+                <a:gd name="connsiteY3" fmla="*/ 1208015 h 1208015"/>
+                <a:gd name="connsiteX0" fmla="*/ 0 w 2021747"/>
+                <a:gd name="connsiteY0" fmla="*/ 0 h 1149292"/>
+                <a:gd name="connsiteX1" fmla="*/ 746620 w 2021747"/>
+                <a:gd name="connsiteY1" fmla="*/ 134224 h 1149292"/>
+                <a:gd name="connsiteX2" fmla="*/ 1090569 w 2021747"/>
+                <a:gd name="connsiteY2" fmla="*/ 1065402 h 1149292"/>
+                <a:gd name="connsiteX3" fmla="*/ 2021747 w 2021747"/>
+                <a:gd name="connsiteY3" fmla="*/ 1149292 h 1149292"/>
+                <a:gd name="connsiteX0" fmla="*/ 0 w 2021747"/>
+                <a:gd name="connsiteY0" fmla="*/ 5285 h 1154577"/>
+                <a:gd name="connsiteX1" fmla="*/ 746620 w 2021747"/>
+                <a:gd name="connsiteY1" fmla="*/ 139509 h 1154577"/>
+                <a:gd name="connsiteX2" fmla="*/ 1090569 w 2021747"/>
+                <a:gd name="connsiteY2" fmla="*/ 1070687 h 1154577"/>
+                <a:gd name="connsiteX3" fmla="*/ 2021747 w 2021747"/>
+                <a:gd name="connsiteY3" fmla="*/ 1154577 h 1154577"/>
+                <a:gd name="connsiteX0" fmla="*/ 0 w 2021747"/>
+                <a:gd name="connsiteY0" fmla="*/ 609 h 1149901"/>
+                <a:gd name="connsiteX1" fmla="*/ 746620 w 2021747"/>
+                <a:gd name="connsiteY1" fmla="*/ 134833 h 1149901"/>
+                <a:gd name="connsiteX2" fmla="*/ 1300654 w 2021747"/>
+                <a:gd name="connsiteY2" fmla="*/ 869432 h 1149901"/>
+                <a:gd name="connsiteX3" fmla="*/ 2021747 w 2021747"/>
+                <a:gd name="connsiteY3" fmla="*/ 1149901 h 1149901"/>
+                <a:gd name="connsiteX0" fmla="*/ 0 w 2021747"/>
+                <a:gd name="connsiteY0" fmla="*/ 972 h 1150264"/>
+                <a:gd name="connsiteX1" fmla="*/ 746620 w 2021747"/>
+                <a:gd name="connsiteY1" fmla="*/ 135196 h 1150264"/>
+                <a:gd name="connsiteX2" fmla="*/ 1300654 w 2021747"/>
+                <a:gd name="connsiteY2" fmla="*/ 900038 h 1150264"/>
+                <a:gd name="connsiteX3" fmla="*/ 2021747 w 2021747"/>
+                <a:gd name="connsiteY3" fmla="*/ 1150264 h 1150264"/>
+                <a:gd name="connsiteX0" fmla="*/ 0 w 2021747"/>
+                <a:gd name="connsiteY0" fmla="*/ 972 h 1150264"/>
+                <a:gd name="connsiteX1" fmla="*/ 746620 w 2021747"/>
+                <a:gd name="connsiteY1" fmla="*/ 135196 h 1150264"/>
+                <a:gd name="connsiteX2" fmla="*/ 1300654 w 2021747"/>
+                <a:gd name="connsiteY2" fmla="*/ 900038 h 1150264"/>
+                <a:gd name="connsiteX3" fmla="*/ 2021747 w 2021747"/>
+                <a:gd name="connsiteY3" fmla="*/ 1150264 h 1150264"/>
+                <a:gd name="connsiteX0" fmla="*/ 0 w 1767690"/>
+                <a:gd name="connsiteY0" fmla="*/ 972 h 1004089"/>
+                <a:gd name="connsiteX1" fmla="*/ 746620 w 1767690"/>
+                <a:gd name="connsiteY1" fmla="*/ 135196 h 1004089"/>
+                <a:gd name="connsiteX2" fmla="*/ 1300654 w 1767690"/>
+                <a:gd name="connsiteY2" fmla="*/ 900038 h 1004089"/>
+                <a:gd name="connsiteX3" fmla="*/ 1767690 w 1767690"/>
+                <a:gd name="connsiteY3" fmla="*/ 1004089 h 1004089"/>
+                <a:gd name="connsiteX0" fmla="*/ 0 w 1767690"/>
+                <a:gd name="connsiteY0" fmla="*/ 972 h 1006466"/>
+                <a:gd name="connsiteX1" fmla="*/ 746620 w 1767690"/>
+                <a:gd name="connsiteY1" fmla="*/ 135196 h 1006466"/>
+                <a:gd name="connsiteX2" fmla="*/ 1300654 w 1767690"/>
+                <a:gd name="connsiteY2" fmla="*/ 900038 h 1006466"/>
+                <a:gd name="connsiteX3" fmla="*/ 1767690 w 1767690"/>
+                <a:gd name="connsiteY3" fmla="*/ 1004089 h 1006466"/>
+                <a:gd name="connsiteX0" fmla="*/ 0 w 1767690"/>
+                <a:gd name="connsiteY0" fmla="*/ 972 h 1006466"/>
+                <a:gd name="connsiteX1" fmla="*/ 746620 w 1767690"/>
+                <a:gd name="connsiteY1" fmla="*/ 135196 h 1006466"/>
+                <a:gd name="connsiteX2" fmla="*/ 1261568 w 1767690"/>
+                <a:gd name="connsiteY2" fmla="*/ 900038 h 1006466"/>
+                <a:gd name="connsiteX3" fmla="*/ 1767690 w 1767690"/>
+                <a:gd name="connsiteY3" fmla="*/ 1004089 h 1006466"/>
+                <a:gd name="connsiteX0" fmla="*/ 0 w 1767690"/>
+                <a:gd name="connsiteY0" fmla="*/ 972 h 1005896"/>
+                <a:gd name="connsiteX1" fmla="*/ 746620 w 1767690"/>
+                <a:gd name="connsiteY1" fmla="*/ 135196 h 1005896"/>
+                <a:gd name="connsiteX2" fmla="*/ 1261568 w 1767690"/>
+                <a:gd name="connsiteY2" fmla="*/ 900038 h 1005896"/>
+                <a:gd name="connsiteX3" fmla="*/ 1767690 w 1767690"/>
+                <a:gd name="connsiteY3" fmla="*/ 1004089 h 1005896"/>
+                <a:gd name="connsiteX0" fmla="*/ 0 w 1806776"/>
+                <a:gd name="connsiteY0" fmla="*/ 972 h 1013046"/>
+                <a:gd name="connsiteX1" fmla="*/ 746620 w 1806776"/>
+                <a:gd name="connsiteY1" fmla="*/ 135196 h 1013046"/>
+                <a:gd name="connsiteX2" fmla="*/ 1261568 w 1806776"/>
+                <a:gd name="connsiteY2" fmla="*/ 900038 h 1013046"/>
+                <a:gd name="connsiteX3" fmla="*/ 1806776 w 1806776"/>
+                <a:gd name="connsiteY3" fmla="*/ 1011650 h 1013046"/>
+                <a:gd name="connsiteX0" fmla="*/ 0 w 1850747"/>
+                <a:gd name="connsiteY0" fmla="*/ 972 h 1013046"/>
+                <a:gd name="connsiteX1" fmla="*/ 790591 w 1850747"/>
+                <a:gd name="connsiteY1" fmla="*/ 135196 h 1013046"/>
+                <a:gd name="connsiteX2" fmla="*/ 1305539 w 1850747"/>
+                <a:gd name="connsiteY2" fmla="*/ 900038 h 1013046"/>
+                <a:gd name="connsiteX3" fmla="*/ 1850747 w 1850747"/>
+                <a:gd name="connsiteY3" fmla="*/ 1011650 h 1013046"/>
+                <a:gd name="connsiteX0" fmla="*/ 0 w 1850747"/>
+                <a:gd name="connsiteY0" fmla="*/ 11691 h 1023765"/>
+                <a:gd name="connsiteX1" fmla="*/ 198990 w 1850747"/>
+                <a:gd name="connsiteY1" fmla="*/ 9473 h 1023765"/>
+                <a:gd name="connsiteX2" fmla="*/ 790591 w 1850747"/>
+                <a:gd name="connsiteY2" fmla="*/ 145915 h 1023765"/>
+                <a:gd name="connsiteX3" fmla="*/ 1305539 w 1850747"/>
+                <a:gd name="connsiteY3" fmla="*/ 910757 h 1023765"/>
+                <a:gd name="connsiteX4" fmla="*/ 1850747 w 1850747"/>
+                <a:gd name="connsiteY4" fmla="*/ 1022369 h 1023765"/>
+                <a:gd name="connsiteX0" fmla="*/ 0 w 1850747"/>
+                <a:gd name="connsiteY0" fmla="*/ 2632 h 1014706"/>
+                <a:gd name="connsiteX1" fmla="*/ 198990 w 1850747"/>
+                <a:gd name="connsiteY1" fmla="*/ 414 h 1014706"/>
+                <a:gd name="connsiteX2" fmla="*/ 790591 w 1850747"/>
+                <a:gd name="connsiteY2" fmla="*/ 136856 h 1014706"/>
+                <a:gd name="connsiteX3" fmla="*/ 1305539 w 1850747"/>
+                <a:gd name="connsiteY3" fmla="*/ 901698 h 1014706"/>
+                <a:gd name="connsiteX4" fmla="*/ 1850747 w 1850747"/>
+                <a:gd name="connsiteY4" fmla="*/ 1013310 h 1014706"/>
+                <a:gd name="connsiteX0" fmla="*/ 0 w 1850747"/>
+                <a:gd name="connsiteY0" fmla="*/ 2632 h 1014706"/>
+                <a:gd name="connsiteX1" fmla="*/ 198990 w 1850747"/>
+                <a:gd name="connsiteY1" fmla="*/ 414 h 1014706"/>
+                <a:gd name="connsiteX2" fmla="*/ 790591 w 1850747"/>
+                <a:gd name="connsiteY2" fmla="*/ 136856 h 1014706"/>
+                <a:gd name="connsiteX3" fmla="*/ 1305539 w 1850747"/>
+                <a:gd name="connsiteY3" fmla="*/ 901698 h 1014706"/>
+                <a:gd name="connsiteX4" fmla="*/ 1850747 w 1850747"/>
+                <a:gd name="connsiteY4" fmla="*/ 1013310 h 1014706"/>
+                <a:gd name="connsiteX0" fmla="*/ 0 w 3386079"/>
+                <a:gd name="connsiteY0" fmla="*/ 0 h 1021525"/>
+                <a:gd name="connsiteX1" fmla="*/ 1734322 w 3386079"/>
+                <a:gd name="connsiteY1" fmla="*/ 7233 h 1021525"/>
+                <a:gd name="connsiteX2" fmla="*/ 2325923 w 3386079"/>
+                <a:gd name="connsiteY2" fmla="*/ 143675 h 1021525"/>
+                <a:gd name="connsiteX3" fmla="*/ 2840871 w 3386079"/>
+                <a:gd name="connsiteY3" fmla="*/ 908517 h 1021525"/>
+                <a:gd name="connsiteX4" fmla="*/ 3386079 w 3386079"/>
+                <a:gd name="connsiteY4" fmla="*/ 1020129 h 1021525"/>
+                <a:gd name="connsiteX0" fmla="*/ 0 w 3386079"/>
+                <a:gd name="connsiteY0" fmla="*/ 0 h 1017744"/>
+                <a:gd name="connsiteX1" fmla="*/ 1734322 w 3386079"/>
+                <a:gd name="connsiteY1" fmla="*/ 3452 h 1017744"/>
+                <a:gd name="connsiteX2" fmla="*/ 2325923 w 3386079"/>
+                <a:gd name="connsiteY2" fmla="*/ 139894 h 1017744"/>
+                <a:gd name="connsiteX3" fmla="*/ 2840871 w 3386079"/>
+                <a:gd name="connsiteY3" fmla="*/ 904736 h 1017744"/>
+                <a:gd name="connsiteX4" fmla="*/ 3386079 w 3386079"/>
+                <a:gd name="connsiteY4" fmla="*/ 1016348 h 1017744"/>
+                <a:gd name="connsiteX0" fmla="*/ 0 w 3386079"/>
+                <a:gd name="connsiteY0" fmla="*/ 4109 h 1014292"/>
+                <a:gd name="connsiteX1" fmla="*/ 1734322 w 3386079"/>
+                <a:gd name="connsiteY1" fmla="*/ 0 h 1014292"/>
+                <a:gd name="connsiteX2" fmla="*/ 2325923 w 3386079"/>
+                <a:gd name="connsiteY2" fmla="*/ 136442 h 1014292"/>
+                <a:gd name="connsiteX3" fmla="*/ 2840871 w 3386079"/>
+                <a:gd name="connsiteY3" fmla="*/ 901284 h 1014292"/>
+                <a:gd name="connsiteX4" fmla="*/ 3386079 w 3386079"/>
+                <a:gd name="connsiteY4" fmla="*/ 1012896 h 1014292"/>
+              </a:gdLst>
+              <a:ahLst/>
+              <a:cxnLst>
+                <a:cxn ang="0">
+                  <a:pos x="connsiteX0" y="connsiteY0"/>
+                </a:cxn>
+                <a:cxn ang="0">
+                  <a:pos x="connsiteX1" y="connsiteY1"/>
+                </a:cxn>
+                <a:cxn ang="0">
+                  <a:pos x="connsiteX2" y="connsiteY2"/>
+                </a:cxn>
+                <a:cxn ang="0">
+                  <a:pos x="connsiteX3" y="connsiteY3"/>
+                </a:cxn>
+                <a:cxn ang="0">
+                  <a:pos x="connsiteX4" y="connsiteY4"/>
+                </a:cxn>
+              </a:cxnLst>
+              <a:rect l="l" t="t" r="r" b="b"/>
+              <a:pathLst>
+                <a:path w="3386079" h="1014292">
+                  <a:moveTo>
+                    <a:pt x="0" y="4109"/>
+                  </a:moveTo>
+                  <a:lnTo>
+                    <a:pt x="1734322" y="0"/>
+                  </a:lnTo>
+                  <a:cubicBezTo>
+                    <a:pt x="1895401" y="11029"/>
+                    <a:pt x="2141498" y="-13772"/>
+                    <a:pt x="2325923" y="136442"/>
+                  </a:cubicBezTo>
+                  <a:cubicBezTo>
+                    <a:pt x="2510348" y="286656"/>
+                    <a:pt x="2596192" y="789431"/>
+                    <a:pt x="2840871" y="901284"/>
+                  </a:cubicBezTo>
+                  <a:cubicBezTo>
+                    <a:pt x="3173493" y="1003056"/>
+                    <a:pt x="3189629" y="1019923"/>
+                    <a:pt x="3386079" y="1012896"/>
+                  </a:cubicBezTo>
+                </a:path>
+              </a:pathLst>
+            </a:custGeom>
+            <a:noFill/>
+            <a:ln w="28575">
+              <a:solidFill>
+                <a:schemeClr val="tx1"/>
+              </a:solidFill>
+            </a:ln>
+          </p:spPr>
+          <p:style>
+            <a:lnRef idx="2">
+              <a:schemeClr val="accent1">
+                <a:shade val="50000"/>
+              </a:schemeClr>
+            </a:lnRef>
+            <a:fillRef idx="1">
+              <a:schemeClr val="accent1"/>
+            </a:fillRef>
+            <a:effectRef idx="0">
+              <a:schemeClr val="accent1"/>
+            </a:effectRef>
+            <a:fontRef idx="minor">
+              <a:schemeClr val="lt1"/>
+            </a:fontRef>
+          </p:style>
+          <p:txBody>
+            <a:bodyPr rtlCol="0" anchor="ctr"/>
+            <a:lstStyle/>
+            <a:p>
+              <a:pPr algn="ctr"/>
+              <a:endParaRPr lang="es-CO"/>
+            </a:p>
+          </p:txBody>
+        </p:sp>
+        <p:sp>
+          <p:nvSpPr>
+            <p:cNvPr id="36" name="Forma libre: forma 35">
+              <a:extLst>
+                <a:ext uri="{FF2B5EF4-FFF2-40B4-BE49-F238E27FC236}">
+                  <a16:creationId xmlns:a16="http://schemas.microsoft.com/office/drawing/2014/main" id="{210CC193-DAB3-4A54-980C-0019C2D1083E}"/>
+                </a:ext>
+              </a:extLst>
+            </p:cNvPr>
+            <p:cNvSpPr/>
+            <p:nvPr/>
+          </p:nvSpPr>
+          <p:spPr>
+            <a:xfrm flipH="1">
+              <a:off x="3307162" y="4017364"/>
+              <a:ext cx="2200462" cy="1277802"/>
+            </a:xfrm>
+            <a:custGeom>
+              <a:avLst/>
+              <a:gdLst>
+                <a:gd name="connsiteX0" fmla="*/ 0 w 2013358"/>
+                <a:gd name="connsiteY0" fmla="*/ 0 h 1208015"/>
+                <a:gd name="connsiteX1" fmla="*/ 545284 w 2013358"/>
+                <a:gd name="connsiteY1" fmla="*/ 536896 h 1208015"/>
+                <a:gd name="connsiteX2" fmla="*/ 1082180 w 2013358"/>
+                <a:gd name="connsiteY2" fmla="*/ 1124125 h 1208015"/>
+                <a:gd name="connsiteX3" fmla="*/ 2013358 w 2013358"/>
+                <a:gd name="connsiteY3" fmla="*/ 1208015 h 1208015"/>
+                <a:gd name="connsiteX0" fmla="*/ 0 w 2013358"/>
+                <a:gd name="connsiteY0" fmla="*/ 0 h 1208015"/>
+                <a:gd name="connsiteX1" fmla="*/ 654341 w 2013358"/>
+                <a:gd name="connsiteY1" fmla="*/ 411061 h 1208015"/>
+                <a:gd name="connsiteX2" fmla="*/ 1082180 w 2013358"/>
+                <a:gd name="connsiteY2" fmla="*/ 1124125 h 1208015"/>
+                <a:gd name="connsiteX3" fmla="*/ 2013358 w 2013358"/>
+                <a:gd name="connsiteY3" fmla="*/ 1208015 h 1208015"/>
+                <a:gd name="connsiteX0" fmla="*/ 0 w 2013358"/>
+                <a:gd name="connsiteY0" fmla="*/ 0 h 1208015"/>
+                <a:gd name="connsiteX1" fmla="*/ 738231 w 2013358"/>
+                <a:gd name="connsiteY1" fmla="*/ 192947 h 1208015"/>
+                <a:gd name="connsiteX2" fmla="*/ 1082180 w 2013358"/>
+                <a:gd name="connsiteY2" fmla="*/ 1124125 h 1208015"/>
+                <a:gd name="connsiteX3" fmla="*/ 2013358 w 2013358"/>
+                <a:gd name="connsiteY3" fmla="*/ 1208015 h 1208015"/>
+                <a:gd name="connsiteX0" fmla="*/ 0 w 2021747"/>
+                <a:gd name="connsiteY0" fmla="*/ 0 h 1149292"/>
+                <a:gd name="connsiteX1" fmla="*/ 746620 w 2021747"/>
+                <a:gd name="connsiteY1" fmla="*/ 134224 h 1149292"/>
+                <a:gd name="connsiteX2" fmla="*/ 1090569 w 2021747"/>
+                <a:gd name="connsiteY2" fmla="*/ 1065402 h 1149292"/>
+                <a:gd name="connsiteX3" fmla="*/ 2021747 w 2021747"/>
+                <a:gd name="connsiteY3" fmla="*/ 1149292 h 1149292"/>
+                <a:gd name="connsiteX0" fmla="*/ 0 w 2021747"/>
+                <a:gd name="connsiteY0" fmla="*/ 5285 h 1154577"/>
+                <a:gd name="connsiteX1" fmla="*/ 746620 w 2021747"/>
+                <a:gd name="connsiteY1" fmla="*/ 139509 h 1154577"/>
+                <a:gd name="connsiteX2" fmla="*/ 1090569 w 2021747"/>
+                <a:gd name="connsiteY2" fmla="*/ 1070687 h 1154577"/>
+                <a:gd name="connsiteX3" fmla="*/ 2021747 w 2021747"/>
+                <a:gd name="connsiteY3" fmla="*/ 1154577 h 1154577"/>
+                <a:gd name="connsiteX0" fmla="*/ 0 w 2021747"/>
+                <a:gd name="connsiteY0" fmla="*/ 609 h 1149901"/>
+                <a:gd name="connsiteX1" fmla="*/ 746620 w 2021747"/>
+                <a:gd name="connsiteY1" fmla="*/ 134833 h 1149901"/>
+                <a:gd name="connsiteX2" fmla="*/ 1300654 w 2021747"/>
+                <a:gd name="connsiteY2" fmla="*/ 869432 h 1149901"/>
+                <a:gd name="connsiteX3" fmla="*/ 2021747 w 2021747"/>
+                <a:gd name="connsiteY3" fmla="*/ 1149901 h 1149901"/>
+                <a:gd name="connsiteX0" fmla="*/ 0 w 2021747"/>
+                <a:gd name="connsiteY0" fmla="*/ 972 h 1150264"/>
+                <a:gd name="connsiteX1" fmla="*/ 746620 w 2021747"/>
+                <a:gd name="connsiteY1" fmla="*/ 135196 h 1150264"/>
+                <a:gd name="connsiteX2" fmla="*/ 1300654 w 2021747"/>
+                <a:gd name="connsiteY2" fmla="*/ 900038 h 1150264"/>
+                <a:gd name="connsiteX3" fmla="*/ 2021747 w 2021747"/>
+                <a:gd name="connsiteY3" fmla="*/ 1150264 h 1150264"/>
+                <a:gd name="connsiteX0" fmla="*/ 0 w 2021747"/>
+                <a:gd name="connsiteY0" fmla="*/ 972 h 1150264"/>
+                <a:gd name="connsiteX1" fmla="*/ 746620 w 2021747"/>
+                <a:gd name="connsiteY1" fmla="*/ 135196 h 1150264"/>
+                <a:gd name="connsiteX2" fmla="*/ 1300654 w 2021747"/>
+                <a:gd name="connsiteY2" fmla="*/ 900038 h 1150264"/>
+                <a:gd name="connsiteX3" fmla="*/ 2021747 w 2021747"/>
+                <a:gd name="connsiteY3" fmla="*/ 1150264 h 1150264"/>
+                <a:gd name="connsiteX0" fmla="*/ 0 w 1767690"/>
+                <a:gd name="connsiteY0" fmla="*/ 972 h 1004089"/>
+                <a:gd name="connsiteX1" fmla="*/ 746620 w 1767690"/>
+                <a:gd name="connsiteY1" fmla="*/ 135196 h 1004089"/>
+                <a:gd name="connsiteX2" fmla="*/ 1300654 w 1767690"/>
+                <a:gd name="connsiteY2" fmla="*/ 900038 h 1004089"/>
+                <a:gd name="connsiteX3" fmla="*/ 1767690 w 1767690"/>
+                <a:gd name="connsiteY3" fmla="*/ 1004089 h 1004089"/>
+                <a:gd name="connsiteX0" fmla="*/ 0 w 1767690"/>
+                <a:gd name="connsiteY0" fmla="*/ 972 h 1006466"/>
+                <a:gd name="connsiteX1" fmla="*/ 746620 w 1767690"/>
+                <a:gd name="connsiteY1" fmla="*/ 135196 h 1006466"/>
+                <a:gd name="connsiteX2" fmla="*/ 1300654 w 1767690"/>
+                <a:gd name="connsiteY2" fmla="*/ 900038 h 1006466"/>
+                <a:gd name="connsiteX3" fmla="*/ 1767690 w 1767690"/>
+                <a:gd name="connsiteY3" fmla="*/ 1004089 h 1006466"/>
+                <a:gd name="connsiteX0" fmla="*/ 0 w 1767690"/>
+                <a:gd name="connsiteY0" fmla="*/ 972 h 1006466"/>
+                <a:gd name="connsiteX1" fmla="*/ 746620 w 1767690"/>
+                <a:gd name="connsiteY1" fmla="*/ 135196 h 1006466"/>
+                <a:gd name="connsiteX2" fmla="*/ 1261568 w 1767690"/>
+                <a:gd name="connsiteY2" fmla="*/ 900038 h 1006466"/>
+                <a:gd name="connsiteX3" fmla="*/ 1767690 w 1767690"/>
+                <a:gd name="connsiteY3" fmla="*/ 1004089 h 1006466"/>
+                <a:gd name="connsiteX0" fmla="*/ 0 w 1767690"/>
+                <a:gd name="connsiteY0" fmla="*/ 972 h 1005896"/>
+                <a:gd name="connsiteX1" fmla="*/ 746620 w 1767690"/>
+                <a:gd name="connsiteY1" fmla="*/ 135196 h 1005896"/>
+                <a:gd name="connsiteX2" fmla="*/ 1261568 w 1767690"/>
+                <a:gd name="connsiteY2" fmla="*/ 900038 h 1005896"/>
+                <a:gd name="connsiteX3" fmla="*/ 1767690 w 1767690"/>
+                <a:gd name="connsiteY3" fmla="*/ 1004089 h 1005896"/>
+                <a:gd name="connsiteX0" fmla="*/ 0 w 1806776"/>
+                <a:gd name="connsiteY0" fmla="*/ 972 h 1013046"/>
+                <a:gd name="connsiteX1" fmla="*/ 746620 w 1806776"/>
+                <a:gd name="connsiteY1" fmla="*/ 135196 h 1013046"/>
+                <a:gd name="connsiteX2" fmla="*/ 1261568 w 1806776"/>
+                <a:gd name="connsiteY2" fmla="*/ 900038 h 1013046"/>
+                <a:gd name="connsiteX3" fmla="*/ 1806776 w 1806776"/>
+                <a:gd name="connsiteY3" fmla="*/ 1011650 h 1013046"/>
+                <a:gd name="connsiteX0" fmla="*/ 0 w 1850747"/>
+                <a:gd name="connsiteY0" fmla="*/ 972 h 1013046"/>
+                <a:gd name="connsiteX1" fmla="*/ 790591 w 1850747"/>
+                <a:gd name="connsiteY1" fmla="*/ 135196 h 1013046"/>
+                <a:gd name="connsiteX2" fmla="*/ 1305539 w 1850747"/>
+                <a:gd name="connsiteY2" fmla="*/ 900038 h 1013046"/>
+                <a:gd name="connsiteX3" fmla="*/ 1850747 w 1850747"/>
+                <a:gd name="connsiteY3" fmla="*/ 1011650 h 1013046"/>
+                <a:gd name="connsiteX0" fmla="*/ 0 w 1850747"/>
+                <a:gd name="connsiteY0" fmla="*/ 11691 h 1023765"/>
+                <a:gd name="connsiteX1" fmla="*/ 198990 w 1850747"/>
+                <a:gd name="connsiteY1" fmla="*/ 9473 h 1023765"/>
+                <a:gd name="connsiteX2" fmla="*/ 790591 w 1850747"/>
+                <a:gd name="connsiteY2" fmla="*/ 145915 h 1023765"/>
+                <a:gd name="connsiteX3" fmla="*/ 1305539 w 1850747"/>
+                <a:gd name="connsiteY3" fmla="*/ 910757 h 1023765"/>
+                <a:gd name="connsiteX4" fmla="*/ 1850747 w 1850747"/>
+                <a:gd name="connsiteY4" fmla="*/ 1022369 h 1023765"/>
+                <a:gd name="connsiteX0" fmla="*/ 0 w 1850747"/>
+                <a:gd name="connsiteY0" fmla="*/ 2632 h 1014706"/>
+                <a:gd name="connsiteX1" fmla="*/ 198990 w 1850747"/>
+                <a:gd name="connsiteY1" fmla="*/ 414 h 1014706"/>
+                <a:gd name="connsiteX2" fmla="*/ 790591 w 1850747"/>
+                <a:gd name="connsiteY2" fmla="*/ 136856 h 1014706"/>
+                <a:gd name="connsiteX3" fmla="*/ 1305539 w 1850747"/>
+                <a:gd name="connsiteY3" fmla="*/ 901698 h 1014706"/>
+                <a:gd name="connsiteX4" fmla="*/ 1850747 w 1850747"/>
+                <a:gd name="connsiteY4" fmla="*/ 1013310 h 1014706"/>
+                <a:gd name="connsiteX0" fmla="*/ 0 w 1850747"/>
+                <a:gd name="connsiteY0" fmla="*/ 2632 h 1014706"/>
+                <a:gd name="connsiteX1" fmla="*/ 198990 w 1850747"/>
+                <a:gd name="connsiteY1" fmla="*/ 414 h 1014706"/>
+                <a:gd name="connsiteX2" fmla="*/ 790591 w 1850747"/>
+                <a:gd name="connsiteY2" fmla="*/ 136856 h 1014706"/>
+                <a:gd name="connsiteX3" fmla="*/ 1305539 w 1850747"/>
+                <a:gd name="connsiteY3" fmla="*/ 901698 h 1014706"/>
+                <a:gd name="connsiteX4" fmla="*/ 1850747 w 1850747"/>
+                <a:gd name="connsiteY4" fmla="*/ 1013310 h 1014706"/>
+                <a:gd name="connsiteX0" fmla="*/ 0 w 3386079"/>
+                <a:gd name="connsiteY0" fmla="*/ 0 h 1021525"/>
+                <a:gd name="connsiteX1" fmla="*/ 1734322 w 3386079"/>
+                <a:gd name="connsiteY1" fmla="*/ 7233 h 1021525"/>
+                <a:gd name="connsiteX2" fmla="*/ 2325923 w 3386079"/>
+                <a:gd name="connsiteY2" fmla="*/ 143675 h 1021525"/>
+                <a:gd name="connsiteX3" fmla="*/ 2840871 w 3386079"/>
+                <a:gd name="connsiteY3" fmla="*/ 908517 h 1021525"/>
+                <a:gd name="connsiteX4" fmla="*/ 3386079 w 3386079"/>
+                <a:gd name="connsiteY4" fmla="*/ 1020129 h 1021525"/>
+                <a:gd name="connsiteX0" fmla="*/ 0 w 3386079"/>
+                <a:gd name="connsiteY0" fmla="*/ 0 h 1017744"/>
+                <a:gd name="connsiteX1" fmla="*/ 1734322 w 3386079"/>
+                <a:gd name="connsiteY1" fmla="*/ 3452 h 1017744"/>
+                <a:gd name="connsiteX2" fmla="*/ 2325923 w 3386079"/>
+                <a:gd name="connsiteY2" fmla="*/ 139894 h 1017744"/>
+                <a:gd name="connsiteX3" fmla="*/ 2840871 w 3386079"/>
+                <a:gd name="connsiteY3" fmla="*/ 904736 h 1017744"/>
+                <a:gd name="connsiteX4" fmla="*/ 3386079 w 3386079"/>
+                <a:gd name="connsiteY4" fmla="*/ 1016348 h 1017744"/>
+                <a:gd name="connsiteX0" fmla="*/ 0 w 3386079"/>
+                <a:gd name="connsiteY0" fmla="*/ 4109 h 1014292"/>
+                <a:gd name="connsiteX1" fmla="*/ 1734322 w 3386079"/>
+                <a:gd name="connsiteY1" fmla="*/ 0 h 1014292"/>
+                <a:gd name="connsiteX2" fmla="*/ 2325923 w 3386079"/>
+                <a:gd name="connsiteY2" fmla="*/ 136442 h 1014292"/>
+                <a:gd name="connsiteX3" fmla="*/ 2840871 w 3386079"/>
+                <a:gd name="connsiteY3" fmla="*/ 901284 h 1014292"/>
+                <a:gd name="connsiteX4" fmla="*/ 3386079 w 3386079"/>
+                <a:gd name="connsiteY4" fmla="*/ 1012896 h 1014292"/>
+              </a:gdLst>
+              <a:ahLst/>
+              <a:cxnLst>
+                <a:cxn ang="0">
+                  <a:pos x="connsiteX0" y="connsiteY0"/>
+                </a:cxn>
+                <a:cxn ang="0">
+                  <a:pos x="connsiteX1" y="connsiteY1"/>
+                </a:cxn>
+                <a:cxn ang="0">
+                  <a:pos x="connsiteX2" y="connsiteY2"/>
+                </a:cxn>
+                <a:cxn ang="0">
+                  <a:pos x="connsiteX3" y="connsiteY3"/>
+                </a:cxn>
+                <a:cxn ang="0">
+                  <a:pos x="connsiteX4" y="connsiteY4"/>
+                </a:cxn>
+              </a:cxnLst>
+              <a:rect l="l" t="t" r="r" b="b"/>
+              <a:pathLst>
+                <a:path w="3386079" h="1014292">
+                  <a:moveTo>
+                    <a:pt x="0" y="4109"/>
+                  </a:moveTo>
+                  <a:lnTo>
+                    <a:pt x="1734322" y="0"/>
+                  </a:lnTo>
+                  <a:cubicBezTo>
+                    <a:pt x="1895401" y="11029"/>
+                    <a:pt x="2141498" y="-13772"/>
+                    <a:pt x="2325923" y="136442"/>
+                  </a:cubicBezTo>
+                  <a:cubicBezTo>
+                    <a:pt x="2510348" y="286656"/>
+                    <a:pt x="2596192" y="789431"/>
+                    <a:pt x="2840871" y="901284"/>
+                  </a:cubicBezTo>
+                  <a:cubicBezTo>
+                    <a:pt x="3173493" y="1003056"/>
+                    <a:pt x="3189629" y="1019923"/>
+                    <a:pt x="3386079" y="1012896"/>
+                  </a:cubicBezTo>
+                </a:path>
+              </a:pathLst>
+            </a:custGeom>
+            <a:noFill/>
+            <a:ln w="28575">
+              <a:solidFill>
+                <a:schemeClr val="tx1"/>
+              </a:solidFill>
+            </a:ln>
+          </p:spPr>
+          <p:style>
+            <a:lnRef idx="2">
+              <a:schemeClr val="accent1">
+                <a:shade val="50000"/>
+              </a:schemeClr>
+            </a:lnRef>
+            <a:fillRef idx="1">
+              <a:schemeClr val="accent1"/>
+            </a:fillRef>
+            <a:effectRef idx="0">
+              <a:schemeClr val="accent1"/>
+            </a:effectRef>
+            <a:fontRef idx="minor">
+              <a:schemeClr val="lt1"/>
+            </a:fontRef>
+          </p:style>
+          <p:txBody>
+            <a:bodyPr rtlCol="0" anchor="ctr"/>
+            <a:lstStyle/>
+            <a:p>
+              <a:pPr algn="ctr"/>
+              <a:endParaRPr lang="es-CO"/>
+            </a:p>
+          </p:txBody>
+        </p:sp>
+      </p:grpSp>
+      <p:sp>
+        <p:nvSpPr>
+          <p:cNvPr id="38" name="CuadroTexto 37">
+            <a:extLst>
+              <a:ext uri="{FF2B5EF4-FFF2-40B4-BE49-F238E27FC236}">
+                <a16:creationId xmlns:a16="http://schemas.microsoft.com/office/drawing/2014/main" id="{EBB794D2-5499-4D18-A9CC-033DC5C69CD9}"/>
+              </a:ext>
+            </a:extLst>
+          </p:cNvPr>
+          <p:cNvSpPr txBox="1"/>
+          <p:nvPr/>
+        </p:nvSpPr>
+        <p:spPr>
+          <a:xfrm>
+            <a:off x="531989" y="3863475"/>
+            <a:ext cx="532518" cy="307777"/>
+          </a:xfrm>
+          <a:prstGeom prst="rect">
+            <a:avLst/>
+          </a:prstGeom>
+          <a:noFill/>
+        </p:spPr>
+        <p:txBody>
+          <a:bodyPr wrap="none" rtlCol="0">
+            <a:spAutoFit/>
+          </a:bodyPr>
+          <a:lstStyle/>
+          <a:p>
+            <a:r>
+              <a:rPr lang="es-ES" sz="1400" dirty="0">
+                <a:latin typeface="Arial" panose="020B0604020202020204" pitchFamily="34" charset="0"/>
+                <a:cs typeface="Arial" panose="020B0604020202020204" pitchFamily="34" charset="0"/>
+              </a:rPr>
+              <a:t>1.00</a:t>
+            </a:r>
+            <a:endParaRPr lang="es-CO" dirty="0">
+              <a:latin typeface="Arial" panose="020B0604020202020204" pitchFamily="34" charset="0"/>
+              <a:cs typeface="Arial" panose="020B0604020202020204" pitchFamily="34" charset="0"/>
+            </a:endParaRPr>
+          </a:p>
+        </p:txBody>
+      </p:sp>
+      <p:sp>
+        <p:nvSpPr>
+          <p:cNvPr id="40" name="CuadroTexto 39">
+            <a:extLst>
+              <a:ext uri="{FF2B5EF4-FFF2-40B4-BE49-F238E27FC236}">
+                <a16:creationId xmlns:a16="http://schemas.microsoft.com/office/drawing/2014/main" id="{9A8FC61B-9329-4BFC-BC67-B2468A8DD041}"/>
+              </a:ext>
+            </a:extLst>
+          </p:cNvPr>
+          <p:cNvSpPr txBox="1"/>
+          <p:nvPr/>
+        </p:nvSpPr>
+        <p:spPr>
+          <a:xfrm>
+            <a:off x="6061956" y="3902744"/>
+            <a:ext cx="532518" cy="307777"/>
+          </a:xfrm>
+          <a:prstGeom prst="rect">
+            <a:avLst/>
+          </a:prstGeom>
+          <a:noFill/>
+        </p:spPr>
+        <p:txBody>
+          <a:bodyPr wrap="none" rtlCol="0">
+            <a:spAutoFit/>
+          </a:bodyPr>
+          <a:lstStyle/>
+          <a:p>
+            <a:r>
+              <a:rPr lang="es-ES" sz="1400" dirty="0">
+                <a:latin typeface="Arial" panose="020B0604020202020204" pitchFamily="34" charset="0"/>
+                <a:cs typeface="Arial" panose="020B0604020202020204" pitchFamily="34" charset="0"/>
+              </a:rPr>
+              <a:t>1.00</a:t>
+            </a:r>
+            <a:endParaRPr lang="es-CO" dirty="0">
+              <a:latin typeface="Arial" panose="020B0604020202020204" pitchFamily="34" charset="0"/>
+              <a:cs typeface="Arial" panose="020B0604020202020204" pitchFamily="34" charset="0"/>
+            </a:endParaRPr>
+          </a:p>
+        </p:txBody>
+      </p:sp>
+      <p:sp>
+        <p:nvSpPr>
+          <p:cNvPr id="42" name="CuadroTexto 41">
+            <a:extLst>
+              <a:ext uri="{FF2B5EF4-FFF2-40B4-BE49-F238E27FC236}">
+                <a16:creationId xmlns:a16="http://schemas.microsoft.com/office/drawing/2014/main" id="{958AF9D7-CC33-477B-A3DE-26E78EF4F2B1}"/>
+              </a:ext>
+            </a:extLst>
+          </p:cNvPr>
+          <p:cNvSpPr txBox="1"/>
+          <p:nvPr/>
+        </p:nvSpPr>
+        <p:spPr>
+          <a:xfrm>
+            <a:off x="508535" y="4878917"/>
+            <a:ext cx="631904" cy="307777"/>
+          </a:xfrm>
+          <a:prstGeom prst="rect">
+            <a:avLst/>
+          </a:prstGeom>
+          <a:noFill/>
+        </p:spPr>
+        <p:txBody>
+          <a:bodyPr wrap="none" rtlCol="0">
+            <a:spAutoFit/>
+          </a:bodyPr>
+          <a:lstStyle/>
+          <a:p>
+            <a:r>
+              <a:rPr lang="es-ES" sz="1400" dirty="0">
+                <a:latin typeface="Arial" panose="020B0604020202020204" pitchFamily="34" charset="0"/>
+                <a:cs typeface="Arial" panose="020B0604020202020204" pitchFamily="34" charset="0"/>
+              </a:rPr>
+              <a:t>0.926</a:t>
+            </a:r>
+            <a:endParaRPr lang="es-CO" dirty="0">
+              <a:latin typeface="Arial" panose="020B0604020202020204" pitchFamily="34" charset="0"/>
+              <a:cs typeface="Arial" panose="020B0604020202020204" pitchFamily="34" charset="0"/>
+            </a:endParaRPr>
+          </a:p>
+        </p:txBody>
+      </p:sp>
+      <p:sp>
+        <p:nvSpPr>
+          <p:cNvPr id="48" name="CuadroTexto 47">
+            <a:extLst>
+              <a:ext uri="{FF2B5EF4-FFF2-40B4-BE49-F238E27FC236}">
+                <a16:creationId xmlns:a16="http://schemas.microsoft.com/office/drawing/2014/main" id="{E7E9BD78-B17E-41F2-B2ED-2338432D33AD}"/>
+              </a:ext>
+            </a:extLst>
+          </p:cNvPr>
+          <p:cNvSpPr txBox="1"/>
+          <p:nvPr/>
+        </p:nvSpPr>
+        <p:spPr>
+          <a:xfrm>
+            <a:off x="5962570" y="5357275"/>
+            <a:ext cx="631904" cy="307777"/>
+          </a:xfrm>
+          <a:prstGeom prst="rect">
+            <a:avLst/>
+          </a:prstGeom>
+          <a:noFill/>
+        </p:spPr>
+        <p:txBody>
+          <a:bodyPr wrap="none" rtlCol="0">
+            <a:spAutoFit/>
+          </a:bodyPr>
+          <a:lstStyle/>
+          <a:p>
+            <a:r>
+              <a:rPr lang="es-ES" sz="1400" dirty="0">
+                <a:latin typeface="Arial" panose="020B0604020202020204" pitchFamily="34" charset="0"/>
+                <a:cs typeface="Arial" panose="020B0604020202020204" pitchFamily="34" charset="0"/>
+              </a:rPr>
+              <a:t>0.852</a:t>
+            </a:r>
+            <a:endParaRPr lang="es-CO" dirty="0">
+              <a:latin typeface="Arial" panose="020B0604020202020204" pitchFamily="34" charset="0"/>
+              <a:cs typeface="Arial" panose="020B0604020202020204" pitchFamily="34" charset="0"/>
+            </a:endParaRPr>
+          </a:p>
+        </p:txBody>
+      </p:sp>
+      <p:sp>
+        <p:nvSpPr>
+          <p:cNvPr id="49" name="CuadroTexto 48">
+            <a:extLst>
+              <a:ext uri="{FF2B5EF4-FFF2-40B4-BE49-F238E27FC236}">
+                <a16:creationId xmlns:a16="http://schemas.microsoft.com/office/drawing/2014/main" id="{3C8F3283-91F0-46E2-8A1C-EEA2CDEADDFD}"/>
+              </a:ext>
+            </a:extLst>
+          </p:cNvPr>
+          <p:cNvSpPr txBox="1"/>
+          <p:nvPr/>
+        </p:nvSpPr>
+        <p:spPr>
+          <a:xfrm rot="16200000">
+            <a:off x="-327830" y="4533755"/>
+            <a:ext cx="1402115" cy="369332"/>
+          </a:xfrm>
+          <a:prstGeom prst="rect">
+            <a:avLst/>
+          </a:prstGeom>
+          <a:noFill/>
+        </p:spPr>
+        <p:txBody>
+          <a:bodyPr wrap="none" rtlCol="0">
+            <a:spAutoFit/>
+          </a:bodyPr>
+          <a:lstStyle/>
+          <a:p>
+            <a:r>
+              <a:rPr lang="es-ES" dirty="0"/>
+              <a:t>Flujo relativo</a:t>
+            </a:r>
+            <a:endParaRPr lang="es-CO" dirty="0"/>
+          </a:p>
+        </p:txBody>
+      </p:sp>
+      <p:sp>
+        <p:nvSpPr>
+          <p:cNvPr id="50" name="CuadroTexto 49">
+            <a:extLst>
+              <a:ext uri="{FF2B5EF4-FFF2-40B4-BE49-F238E27FC236}">
+                <a16:creationId xmlns:a16="http://schemas.microsoft.com/office/drawing/2014/main" id="{843DB90C-3192-494F-9715-9A9883732A09}"/>
+              </a:ext>
+            </a:extLst>
+          </p:cNvPr>
+          <p:cNvSpPr txBox="1"/>
+          <p:nvPr/>
+        </p:nvSpPr>
+        <p:spPr>
+          <a:xfrm>
+            <a:off x="2839794" y="5694812"/>
+            <a:ext cx="893193" cy="369332"/>
+          </a:xfrm>
+          <a:prstGeom prst="rect">
+            <a:avLst/>
+          </a:prstGeom>
+          <a:noFill/>
+        </p:spPr>
+        <p:txBody>
+          <a:bodyPr wrap="none" rtlCol="0">
+            <a:spAutoFit/>
+          </a:bodyPr>
+          <a:lstStyle/>
+          <a:p>
+            <a:r>
+              <a:rPr lang="es-ES" dirty="0"/>
+              <a:t>Tiempo</a:t>
+            </a:r>
+            <a:endParaRPr lang="es-CO" dirty="0"/>
+          </a:p>
+        </p:txBody>
+      </p:sp>
+      <p:sp>
+        <p:nvSpPr>
+          <p:cNvPr id="52" name="CuadroTexto 51">
+            <a:extLst>
+              <a:ext uri="{FF2B5EF4-FFF2-40B4-BE49-F238E27FC236}">
+                <a16:creationId xmlns:a16="http://schemas.microsoft.com/office/drawing/2014/main" id="{F25DD62C-5E10-425D-8B7E-233DFE1A839C}"/>
+              </a:ext>
+            </a:extLst>
+          </p:cNvPr>
+          <p:cNvSpPr txBox="1"/>
+          <p:nvPr/>
+        </p:nvSpPr>
+        <p:spPr>
+          <a:xfrm rot="16200000">
+            <a:off x="4988345" y="4303925"/>
+            <a:ext cx="1838080" cy="369332"/>
+          </a:xfrm>
+          <a:prstGeom prst="rect">
+            <a:avLst/>
+          </a:prstGeom>
+          <a:noFill/>
+        </p:spPr>
+        <p:txBody>
+          <a:bodyPr wrap="square" rtlCol="0">
+            <a:spAutoFit/>
+          </a:bodyPr>
+          <a:lstStyle/>
+          <a:p>
+            <a:r>
+              <a:rPr lang="es-ES" dirty="0"/>
+              <a:t>Flujo relativo</a:t>
+            </a:r>
+            <a:endParaRPr lang="es-CO" dirty="0"/>
+          </a:p>
+        </p:txBody>
+      </p:sp>
+      <p:sp>
+        <p:nvSpPr>
+          <p:cNvPr id="54" name="CuadroTexto 53">
+            <a:extLst>
+              <a:ext uri="{FF2B5EF4-FFF2-40B4-BE49-F238E27FC236}">
+                <a16:creationId xmlns:a16="http://schemas.microsoft.com/office/drawing/2014/main" id="{178A9100-AD23-464B-8202-0DC483B4EDBE}"/>
+              </a:ext>
+            </a:extLst>
+          </p:cNvPr>
+          <p:cNvSpPr txBox="1"/>
+          <p:nvPr/>
+        </p:nvSpPr>
+        <p:spPr>
+          <a:xfrm>
+            <a:off x="8486777" y="5665052"/>
+            <a:ext cx="893193" cy="369332"/>
+          </a:xfrm>
+          <a:prstGeom prst="rect">
+            <a:avLst/>
+          </a:prstGeom>
+          <a:noFill/>
+        </p:spPr>
+        <p:txBody>
+          <a:bodyPr wrap="none" rtlCol="0">
+            <a:spAutoFit/>
+          </a:bodyPr>
+          <a:lstStyle/>
+          <a:p>
+            <a:r>
+              <a:rPr lang="es-ES" dirty="0"/>
+              <a:t>Tiempo</a:t>
+            </a:r>
+            <a:endParaRPr lang="es-CO" dirty="0"/>
+          </a:p>
+        </p:txBody>
+      </p:sp>
+    </p:spTree>
+    <p:extLst>
+      <p:ext uri="{BB962C8B-B14F-4D97-AF65-F5344CB8AC3E}">
+        <p14:creationId xmlns:p14="http://schemas.microsoft.com/office/powerpoint/2010/main" val="900025270"/>
+      </p:ext>
+    </p:extLst>
+  </p:cSld>
+  <p:clrMapOvr>
+    <a:masterClrMapping/>
+  </p:clrMapOvr>
+</p:sld>
+</file>
+
+<file path=ppt/slides/slide3.xml><?xml version="1.0" encoding="utf-8"?>
+<p:sld xmlns:a="http://schemas.openxmlformats.org/drawingml/2006/main" xmlns:r="http://schemas.openxmlformats.org/officeDocument/2006/relationships" xmlns:p="http://schemas.openxmlformats.org/presentationml/2006/main">
+  <p:cSld>
+    <p:spTree>
+      <p:nvGrpSpPr>
+        <p:cNvPr id="1" name=""/>
+        <p:cNvGrpSpPr/>
+        <p:nvPr/>
+      </p:nvGrpSpPr>
+      <p:grpSpPr>
+        <a:xfrm>
+          <a:off x="0" y="0"/>
+          <a:ext cx="0" cy="0"/>
+          <a:chOff x="0" y="0"/>
+          <a:chExt cx="0" cy="0"/>
+        </a:xfrm>
+      </p:grpSpPr>
+      <p:cxnSp>
+        <p:nvCxnSpPr>
+          <p:cNvPr id="10" name="Conector recto 9">
+            <a:extLst>
+              <a:ext uri="{FF2B5EF4-FFF2-40B4-BE49-F238E27FC236}">
+                <a16:creationId xmlns:a16="http://schemas.microsoft.com/office/drawing/2014/main" id="{5DD4E830-83BE-4D3C-91E5-6E00F88D61E7}"/>
+              </a:ext>
+            </a:extLst>
+          </p:cNvPr>
+          <p:cNvCxnSpPr>
+            <a:cxnSpLocks/>
+          </p:cNvCxnSpPr>
+          <p:nvPr/>
+        </p:nvCxnSpPr>
+        <p:spPr>
+          <a:xfrm flipH="1">
+            <a:off x="1896840" y="2377439"/>
+            <a:ext cx="4363948" cy="0"/>
+          </a:xfrm>
+          <a:prstGeom prst="line">
+            <a:avLst/>
+          </a:prstGeom>
+          <a:ln w="28575">
+            <a:solidFill>
+              <a:schemeClr val="bg2">
+                <a:lumMod val="75000"/>
+              </a:schemeClr>
+            </a:solidFill>
+          </a:ln>
+        </p:spPr>
+        <p:style>
+          <a:lnRef idx="1">
+            <a:schemeClr val="accent1"/>
+          </a:lnRef>
+          <a:fillRef idx="0">
+            <a:schemeClr val="accent1"/>
+          </a:fillRef>
+          <a:effectRef idx="0">
+            <a:schemeClr val="accent1"/>
+          </a:effectRef>
+          <a:fontRef idx="minor">
+            <a:schemeClr val="tx1"/>
+          </a:fontRef>
+        </p:style>
+      </p:cxnSp>
+      <p:cxnSp>
+        <p:nvCxnSpPr>
+          <p:cNvPr id="11" name="Conector recto de flecha 10">
+            <a:extLst>
+              <a:ext uri="{FF2B5EF4-FFF2-40B4-BE49-F238E27FC236}">
+                <a16:creationId xmlns:a16="http://schemas.microsoft.com/office/drawing/2014/main" id="{84BC1B81-FE14-47E4-9679-AC5BB5CFA844}"/>
+              </a:ext>
+            </a:extLst>
+          </p:cNvPr>
+          <p:cNvCxnSpPr>
+            <a:cxnSpLocks/>
+          </p:cNvCxnSpPr>
+          <p:nvPr/>
+        </p:nvCxnSpPr>
+        <p:spPr>
+          <a:xfrm flipV="1">
+            <a:off x="1908693" y="615000"/>
+            <a:ext cx="0" cy="1950097"/>
+          </a:xfrm>
+          <a:prstGeom prst="straightConnector1">
+            <a:avLst/>
+          </a:prstGeom>
+          <a:ln w="19050">
+            <a:solidFill>
+              <a:schemeClr val="tx1"/>
+            </a:solidFill>
+            <a:tailEnd type="triangle"/>
+          </a:ln>
+        </p:spPr>
+        <p:style>
+          <a:lnRef idx="1">
+            <a:schemeClr val="accent1"/>
+          </a:lnRef>
+          <a:fillRef idx="0">
+            <a:schemeClr val="accent1"/>
+          </a:fillRef>
+          <a:effectRef idx="0">
+            <a:schemeClr val="accent1"/>
+          </a:effectRef>
+          <a:fontRef idx="minor">
+            <a:schemeClr val="tx1"/>
+          </a:fontRef>
+        </p:style>
+      </p:cxnSp>
+      <p:cxnSp>
+        <p:nvCxnSpPr>
+          <p:cNvPr id="12" name="Conector recto de flecha 11">
+            <a:extLst>
+              <a:ext uri="{FF2B5EF4-FFF2-40B4-BE49-F238E27FC236}">
+                <a16:creationId xmlns:a16="http://schemas.microsoft.com/office/drawing/2014/main" id="{34354A35-0721-437F-A7E2-C2BF35F87F05}"/>
+              </a:ext>
+            </a:extLst>
+          </p:cNvPr>
+          <p:cNvCxnSpPr/>
+          <p:nvPr/>
+        </p:nvCxnSpPr>
+        <p:spPr>
+          <a:xfrm>
+            <a:off x="1908693" y="2565097"/>
+            <a:ext cx="4469363" cy="0"/>
+          </a:xfrm>
+          <a:prstGeom prst="straightConnector1">
+            <a:avLst/>
+          </a:prstGeom>
+          <a:ln w="19050">
+            <a:solidFill>
+              <a:schemeClr val="tx1"/>
+            </a:solidFill>
+            <a:tailEnd type="triangle"/>
+          </a:ln>
+        </p:spPr>
+        <p:style>
+          <a:lnRef idx="1">
+            <a:schemeClr val="accent1"/>
+          </a:lnRef>
+          <a:fillRef idx="0">
+            <a:schemeClr val="accent1"/>
+          </a:fillRef>
+          <a:effectRef idx="0">
+            <a:schemeClr val="accent1"/>
+          </a:effectRef>
+          <a:fontRef idx="minor">
+            <a:schemeClr val="tx1"/>
+          </a:fontRef>
+        </p:style>
+      </p:cxnSp>
+      <p:grpSp>
+        <p:nvGrpSpPr>
+          <p:cNvPr id="13" name="Grupo 12">
+            <a:extLst>
+              <a:ext uri="{FF2B5EF4-FFF2-40B4-BE49-F238E27FC236}">
+                <a16:creationId xmlns:a16="http://schemas.microsoft.com/office/drawing/2014/main" id="{049906AA-BDC0-44D6-962F-C0AF2E35B28F}"/>
+              </a:ext>
+            </a:extLst>
+          </p:cNvPr>
+          <p:cNvGrpSpPr/>
+          <p:nvPr/>
+        </p:nvGrpSpPr>
+        <p:grpSpPr>
+          <a:xfrm>
+            <a:off x="1912192" y="915264"/>
+            <a:ext cx="4329016" cy="1462175"/>
+            <a:chOff x="720713" y="592654"/>
+            <a:chExt cx="4109034" cy="1160645"/>
+          </a:xfrm>
+        </p:grpSpPr>
+        <p:sp>
+          <p:nvSpPr>
+            <p:cNvPr id="14" name="Forma libre: forma 13">
+              <a:extLst>
+                <a:ext uri="{FF2B5EF4-FFF2-40B4-BE49-F238E27FC236}">
+                  <a16:creationId xmlns:a16="http://schemas.microsoft.com/office/drawing/2014/main" id="{1596CEB8-8E8E-43F8-BC60-D76789E263C8}"/>
+                </a:ext>
+              </a:extLst>
+            </p:cNvPr>
+            <p:cNvSpPr/>
+            <p:nvPr/>
+          </p:nvSpPr>
+          <p:spPr>
+            <a:xfrm>
+              <a:off x="720713" y="592654"/>
+              <a:ext cx="2148321" cy="1160645"/>
+            </a:xfrm>
+            <a:custGeom>
+              <a:avLst/>
+              <a:gdLst>
+                <a:gd name="connsiteX0" fmla="*/ 0 w 2013358"/>
+                <a:gd name="connsiteY0" fmla="*/ 0 h 1208015"/>
+                <a:gd name="connsiteX1" fmla="*/ 545284 w 2013358"/>
+                <a:gd name="connsiteY1" fmla="*/ 536896 h 1208015"/>
+                <a:gd name="connsiteX2" fmla="*/ 1082180 w 2013358"/>
+                <a:gd name="connsiteY2" fmla="*/ 1124125 h 1208015"/>
+                <a:gd name="connsiteX3" fmla="*/ 2013358 w 2013358"/>
+                <a:gd name="connsiteY3" fmla="*/ 1208015 h 1208015"/>
+                <a:gd name="connsiteX0" fmla="*/ 0 w 2013358"/>
+                <a:gd name="connsiteY0" fmla="*/ 0 h 1208015"/>
+                <a:gd name="connsiteX1" fmla="*/ 654341 w 2013358"/>
+                <a:gd name="connsiteY1" fmla="*/ 411061 h 1208015"/>
+                <a:gd name="connsiteX2" fmla="*/ 1082180 w 2013358"/>
+                <a:gd name="connsiteY2" fmla="*/ 1124125 h 1208015"/>
+                <a:gd name="connsiteX3" fmla="*/ 2013358 w 2013358"/>
+                <a:gd name="connsiteY3" fmla="*/ 1208015 h 1208015"/>
+                <a:gd name="connsiteX0" fmla="*/ 0 w 2013358"/>
+                <a:gd name="connsiteY0" fmla="*/ 0 h 1208015"/>
+                <a:gd name="connsiteX1" fmla="*/ 738231 w 2013358"/>
+                <a:gd name="connsiteY1" fmla="*/ 192947 h 1208015"/>
+                <a:gd name="connsiteX2" fmla="*/ 1082180 w 2013358"/>
+                <a:gd name="connsiteY2" fmla="*/ 1124125 h 1208015"/>
+                <a:gd name="connsiteX3" fmla="*/ 2013358 w 2013358"/>
+                <a:gd name="connsiteY3" fmla="*/ 1208015 h 1208015"/>
+                <a:gd name="connsiteX0" fmla="*/ 0 w 2021747"/>
+                <a:gd name="connsiteY0" fmla="*/ 0 h 1149292"/>
+                <a:gd name="connsiteX1" fmla="*/ 746620 w 2021747"/>
+                <a:gd name="connsiteY1" fmla="*/ 134224 h 1149292"/>
+                <a:gd name="connsiteX2" fmla="*/ 1090569 w 2021747"/>
+                <a:gd name="connsiteY2" fmla="*/ 1065402 h 1149292"/>
+                <a:gd name="connsiteX3" fmla="*/ 2021747 w 2021747"/>
+                <a:gd name="connsiteY3" fmla="*/ 1149292 h 1149292"/>
+                <a:gd name="connsiteX0" fmla="*/ 0 w 2021747"/>
+                <a:gd name="connsiteY0" fmla="*/ 5285 h 1154577"/>
+                <a:gd name="connsiteX1" fmla="*/ 746620 w 2021747"/>
+                <a:gd name="connsiteY1" fmla="*/ 139509 h 1154577"/>
+                <a:gd name="connsiteX2" fmla="*/ 1090569 w 2021747"/>
+                <a:gd name="connsiteY2" fmla="*/ 1070687 h 1154577"/>
+                <a:gd name="connsiteX3" fmla="*/ 2021747 w 2021747"/>
+                <a:gd name="connsiteY3" fmla="*/ 1154577 h 1154577"/>
+                <a:gd name="connsiteX0" fmla="*/ 0 w 2148321"/>
+                <a:gd name="connsiteY0" fmla="*/ 3792 h 1160645"/>
+                <a:gd name="connsiteX1" fmla="*/ 873194 w 2148321"/>
+                <a:gd name="connsiteY1" fmla="*/ 145577 h 1160645"/>
+                <a:gd name="connsiteX2" fmla="*/ 1217143 w 2148321"/>
+                <a:gd name="connsiteY2" fmla="*/ 1076755 h 1160645"/>
+                <a:gd name="connsiteX3" fmla="*/ 2148321 w 2148321"/>
+                <a:gd name="connsiteY3" fmla="*/ 1160645 h 1160645"/>
+              </a:gdLst>
+              <a:ahLst/>
+              <a:cxnLst>
+                <a:cxn ang="0">
+                  <a:pos x="connsiteX0" y="connsiteY0"/>
+                </a:cxn>
+                <a:cxn ang="0">
+                  <a:pos x="connsiteX1" y="connsiteY1"/>
+                </a:cxn>
+                <a:cxn ang="0">
+                  <a:pos x="connsiteX2" y="connsiteY2"/>
+                </a:cxn>
+                <a:cxn ang="0">
+                  <a:pos x="connsiteX3" y="connsiteY3"/>
+                </a:cxn>
+              </a:cxnLst>
+              <a:rect l="l" t="t" r="r" b="b"/>
+              <a:pathLst>
+                <a:path w="2148321" h="1160645">
+                  <a:moveTo>
+                    <a:pt x="0" y="3792"/>
+                  </a:moveTo>
+                  <a:cubicBezTo>
+                    <a:pt x="358629" y="2394"/>
+                    <a:pt x="670337" y="-33250"/>
+                    <a:pt x="873194" y="145577"/>
+                  </a:cubicBezTo>
+                  <a:cubicBezTo>
+                    <a:pt x="1076051" y="324404"/>
+                    <a:pt x="972464" y="964902"/>
+                    <a:pt x="1217143" y="1076755"/>
+                  </a:cubicBezTo>
+                  <a:cubicBezTo>
+                    <a:pt x="1461822" y="1188608"/>
+                    <a:pt x="1946985" y="1142469"/>
+                    <a:pt x="2148321" y="1160645"/>
+                  </a:cubicBezTo>
+                </a:path>
+              </a:pathLst>
+            </a:custGeom>
+            <a:noFill/>
+            <a:ln w="28575">
+              <a:solidFill>
+                <a:schemeClr val="tx1"/>
+              </a:solidFill>
+            </a:ln>
+          </p:spPr>
+          <p:style>
+            <a:lnRef idx="2">
+              <a:schemeClr val="accent1">
+                <a:shade val="50000"/>
+              </a:schemeClr>
+            </a:lnRef>
+            <a:fillRef idx="1">
+              <a:schemeClr val="accent1"/>
+            </a:fillRef>
+            <a:effectRef idx="0">
+              <a:schemeClr val="accent1"/>
+            </a:effectRef>
+            <a:fontRef idx="minor">
+              <a:schemeClr val="lt1"/>
+            </a:fontRef>
+          </p:style>
+          <p:txBody>
+            <a:bodyPr rtlCol="0" anchor="ctr"/>
+            <a:lstStyle/>
+            <a:p>
+              <a:pPr algn="ctr"/>
+              <a:endParaRPr lang="es-CO" dirty="0"/>
+            </a:p>
+          </p:txBody>
+        </p:sp>
+        <p:sp>
+          <p:nvSpPr>
+            <p:cNvPr id="15" name="Forma libre: forma 14">
+              <a:extLst>
+                <a:ext uri="{FF2B5EF4-FFF2-40B4-BE49-F238E27FC236}">
+                  <a16:creationId xmlns:a16="http://schemas.microsoft.com/office/drawing/2014/main" id="{F2B26992-5E92-436E-89D6-4C0CA396F32F}"/>
+                </a:ext>
+              </a:extLst>
+            </p:cNvPr>
+            <p:cNvSpPr/>
+            <p:nvPr/>
+          </p:nvSpPr>
+          <p:spPr>
+            <a:xfrm flipH="1">
+              <a:off x="2808000" y="598722"/>
+              <a:ext cx="2021747" cy="1154577"/>
+            </a:xfrm>
+            <a:custGeom>
+              <a:avLst/>
+              <a:gdLst>
+                <a:gd name="connsiteX0" fmla="*/ 0 w 2013358"/>
+                <a:gd name="connsiteY0" fmla="*/ 0 h 1208015"/>
+                <a:gd name="connsiteX1" fmla="*/ 545284 w 2013358"/>
+                <a:gd name="connsiteY1" fmla="*/ 536896 h 1208015"/>
+                <a:gd name="connsiteX2" fmla="*/ 1082180 w 2013358"/>
+                <a:gd name="connsiteY2" fmla="*/ 1124125 h 1208015"/>
+                <a:gd name="connsiteX3" fmla="*/ 2013358 w 2013358"/>
+                <a:gd name="connsiteY3" fmla="*/ 1208015 h 1208015"/>
+                <a:gd name="connsiteX0" fmla="*/ 0 w 2013358"/>
+                <a:gd name="connsiteY0" fmla="*/ 0 h 1208015"/>
+                <a:gd name="connsiteX1" fmla="*/ 654341 w 2013358"/>
+                <a:gd name="connsiteY1" fmla="*/ 411061 h 1208015"/>
+                <a:gd name="connsiteX2" fmla="*/ 1082180 w 2013358"/>
+                <a:gd name="connsiteY2" fmla="*/ 1124125 h 1208015"/>
+                <a:gd name="connsiteX3" fmla="*/ 2013358 w 2013358"/>
+                <a:gd name="connsiteY3" fmla="*/ 1208015 h 1208015"/>
+                <a:gd name="connsiteX0" fmla="*/ 0 w 2013358"/>
+                <a:gd name="connsiteY0" fmla="*/ 0 h 1208015"/>
+                <a:gd name="connsiteX1" fmla="*/ 738231 w 2013358"/>
+                <a:gd name="connsiteY1" fmla="*/ 192947 h 1208015"/>
+                <a:gd name="connsiteX2" fmla="*/ 1082180 w 2013358"/>
+                <a:gd name="connsiteY2" fmla="*/ 1124125 h 1208015"/>
+                <a:gd name="connsiteX3" fmla="*/ 2013358 w 2013358"/>
+                <a:gd name="connsiteY3" fmla="*/ 1208015 h 1208015"/>
+                <a:gd name="connsiteX0" fmla="*/ 0 w 2021747"/>
+                <a:gd name="connsiteY0" fmla="*/ 0 h 1149292"/>
+                <a:gd name="connsiteX1" fmla="*/ 746620 w 2021747"/>
+                <a:gd name="connsiteY1" fmla="*/ 134224 h 1149292"/>
+                <a:gd name="connsiteX2" fmla="*/ 1090569 w 2021747"/>
+                <a:gd name="connsiteY2" fmla="*/ 1065402 h 1149292"/>
+                <a:gd name="connsiteX3" fmla="*/ 2021747 w 2021747"/>
+                <a:gd name="connsiteY3" fmla="*/ 1149292 h 1149292"/>
+                <a:gd name="connsiteX0" fmla="*/ 0 w 2021747"/>
+                <a:gd name="connsiteY0" fmla="*/ 5285 h 1154577"/>
+                <a:gd name="connsiteX1" fmla="*/ 746620 w 2021747"/>
+                <a:gd name="connsiteY1" fmla="*/ 139509 h 1154577"/>
+                <a:gd name="connsiteX2" fmla="*/ 1090569 w 2021747"/>
+                <a:gd name="connsiteY2" fmla="*/ 1070687 h 1154577"/>
+                <a:gd name="connsiteX3" fmla="*/ 2021747 w 2021747"/>
+                <a:gd name="connsiteY3" fmla="*/ 1154577 h 1154577"/>
+              </a:gdLst>
+              <a:ahLst/>
+              <a:cxnLst>
+                <a:cxn ang="0">
+                  <a:pos x="connsiteX0" y="connsiteY0"/>
+                </a:cxn>
+                <a:cxn ang="0">
+                  <a:pos x="connsiteX1" y="connsiteY1"/>
+                </a:cxn>
+                <a:cxn ang="0">
+                  <a:pos x="connsiteX2" y="connsiteY2"/>
+                </a:cxn>
+                <a:cxn ang="0">
+                  <a:pos x="connsiteX3" y="connsiteY3"/>
+                </a:cxn>
+              </a:cxnLst>
+              <a:rect l="l" t="t" r="r" b="b"/>
+              <a:pathLst>
+                <a:path w="2021747" h="1154577">
+                  <a:moveTo>
+                    <a:pt x="0" y="5285"/>
+                  </a:moveTo>
+                  <a:cubicBezTo>
+                    <a:pt x="358629" y="3887"/>
+                    <a:pt x="564859" y="-38058"/>
+                    <a:pt x="746620" y="139509"/>
+                  </a:cubicBezTo>
+                  <a:cubicBezTo>
+                    <a:pt x="928381" y="317076"/>
+                    <a:pt x="845890" y="958834"/>
+                    <a:pt x="1090569" y="1070687"/>
+                  </a:cubicBezTo>
+                  <a:cubicBezTo>
+                    <a:pt x="1335248" y="1182540"/>
+                    <a:pt x="1820411" y="1136401"/>
+                    <a:pt x="2021747" y="1154577"/>
+                  </a:cubicBezTo>
+                </a:path>
+              </a:pathLst>
+            </a:custGeom>
+            <a:noFill/>
+            <a:ln w="28575">
+              <a:solidFill>
+                <a:schemeClr val="tx1"/>
+              </a:solidFill>
+            </a:ln>
+          </p:spPr>
+          <p:style>
+            <a:lnRef idx="2">
+              <a:schemeClr val="accent1">
+                <a:shade val="50000"/>
+              </a:schemeClr>
+            </a:lnRef>
+            <a:fillRef idx="1">
+              <a:schemeClr val="accent1"/>
+            </a:fillRef>
+            <a:effectRef idx="0">
+              <a:schemeClr val="accent1"/>
+            </a:effectRef>
+            <a:fontRef idx="minor">
+              <a:schemeClr val="lt1"/>
+            </a:fontRef>
+          </p:style>
+          <p:txBody>
+            <a:bodyPr rtlCol="0" anchor="ctr"/>
+            <a:lstStyle/>
+            <a:p>
+              <a:pPr algn="ctr"/>
+              <a:endParaRPr lang="es-CO"/>
+            </a:p>
+          </p:txBody>
+        </p:sp>
+      </p:grpSp>
+      <mc:AlternateContent xmlns:mc="http://schemas.openxmlformats.org/markup-compatibility/2006">
+        <mc:Choice xmlns:a14="http://schemas.microsoft.com/office/drawing/2010/main" Requires="a14">
+          <p:sp>
+            <p:nvSpPr>
+              <p:cNvPr id="16" name="CuadroTexto 15">
+                <a:extLst>
+                  <a:ext uri="{FF2B5EF4-FFF2-40B4-BE49-F238E27FC236}">
+                    <a16:creationId xmlns:a16="http://schemas.microsoft.com/office/drawing/2014/main" id="{BBB2DDB9-FC71-4EC0-A659-CEDACE421B68}"/>
+                  </a:ext>
+                </a:extLst>
+              </p:cNvPr>
+              <p:cNvSpPr txBox="1"/>
+              <p:nvPr/>
+            </p:nvSpPr>
+            <p:spPr>
+              <a:xfrm>
+                <a:off x="1638733" y="776764"/>
+                <a:ext cx="181140" cy="276999"/>
+              </a:xfrm>
+              <a:prstGeom prst="rect">
+                <a:avLst/>
+              </a:prstGeom>
+              <a:noFill/>
+            </p:spPr>
+            <p:txBody>
+              <a:bodyPr wrap="none" lIns="0" tIns="0" rIns="0" bIns="0" rtlCol="0">
+                <a:spAutoFit/>
+              </a:bodyPr>
+              <a:lstStyle/>
+              <a:p>
+                <a14:m>
+                  <m:oMathPara xmlns:m="http://schemas.openxmlformats.org/officeDocument/2006/math">
+                    <m:oMathParaPr>
+                      <m:jc m:val="centerGroup"/>
+                    </m:oMathParaPr>
+                    <m:oMath xmlns:m="http://schemas.openxmlformats.org/officeDocument/2006/math">
+                      <m:r>
+                        <a:rPr lang="es-CO" i="1" smtClean="0">
+                          <a:latin typeface="Cambria Math" panose="02040503050406030204" pitchFamily="18" charset="0"/>
+                          <a:ea typeface="Cambria Math" panose="02040503050406030204" pitchFamily="18" charset="0"/>
+                        </a:rPr>
+                        <m:t>1</m:t>
+                      </m:r>
+                    </m:oMath>
+                  </m:oMathPara>
+                </a14:m>
+                <a:endParaRPr lang="es-CO" dirty="0"/>
+              </a:p>
+            </p:txBody>
+          </p:sp>
+        </mc:Choice>
+        <mc:Fallback>
+          <p:sp>
+            <p:nvSpPr>
+              <p:cNvPr id="16" name="CuadroTexto 15">
+                <a:extLst>
+                  <a:ext uri="{FF2B5EF4-FFF2-40B4-BE49-F238E27FC236}">
+                    <a16:creationId xmlns:a16="http://schemas.microsoft.com/office/drawing/2014/main" id="{BBB2DDB9-FC71-4EC0-A659-CEDACE421B68}"/>
+                  </a:ext>
+                </a:extLst>
+              </p:cNvPr>
+              <p:cNvSpPr txBox="1">
+                <a:spLocks noRot="1" noChangeAspect="1" noMove="1" noResize="1" noEditPoints="1" noAdjustHandles="1" noChangeArrowheads="1" noChangeShapeType="1" noTextEdit="1"/>
+              </p:cNvSpPr>
+              <p:nvPr/>
+            </p:nvSpPr>
+            <p:spPr>
+              <a:xfrm>
+                <a:off x="1638733" y="776764"/>
+                <a:ext cx="181140" cy="276999"/>
+              </a:xfrm>
+              <a:prstGeom prst="rect">
+                <a:avLst/>
+              </a:prstGeom>
+              <a:blipFill>
+                <a:blip r:embed="rId2"/>
+                <a:stretch>
+                  <a:fillRect l="-33333" r="-26667" b="-6522"/>
+                </a:stretch>
+              </a:blipFill>
+            </p:spPr>
+            <p:txBody>
+              <a:bodyPr/>
+              <a:lstStyle/>
+              <a:p>
+                <a:r>
+                  <a:rPr lang="es-CO">
+                    <a:noFill/>
+                  </a:rPr>
+                  <a:t> </a:t>
+                </a:r>
+              </a:p>
+            </p:txBody>
+          </p:sp>
+        </mc:Fallback>
+      </mc:AlternateContent>
+      <mc:AlternateContent xmlns:mc="http://schemas.openxmlformats.org/markup-compatibility/2006">
+        <mc:Choice xmlns:a14="http://schemas.microsoft.com/office/drawing/2010/main" Requires="a14">
+          <p:sp>
+            <p:nvSpPr>
+              <p:cNvPr id="18" name="CuadroTexto 17">
+                <a:extLst>
+                  <a:ext uri="{FF2B5EF4-FFF2-40B4-BE49-F238E27FC236}">
+                    <a16:creationId xmlns:a16="http://schemas.microsoft.com/office/drawing/2014/main" id="{6922637F-40B6-46CE-B549-A4EE0C2C5062}"/>
+                  </a:ext>
+                </a:extLst>
+              </p:cNvPr>
+              <p:cNvSpPr txBox="1"/>
+              <p:nvPr/>
+            </p:nvSpPr>
+            <p:spPr>
+              <a:xfrm>
+                <a:off x="1053430" y="2064372"/>
+                <a:ext cx="799000" cy="626133"/>
+              </a:xfrm>
+              <a:prstGeom prst="rect">
+                <a:avLst/>
+              </a:prstGeom>
+              <a:noFill/>
+            </p:spPr>
+            <p:txBody>
+              <a:bodyPr wrap="none" lIns="0" tIns="0" rIns="0" bIns="0" rtlCol="0">
+                <a:spAutoFit/>
+              </a:bodyPr>
+              <a:lstStyle/>
+              <a:p>
+                <a:pPr/>
+                <a14:m>
+                  <m:oMathPara xmlns:m="http://schemas.openxmlformats.org/officeDocument/2006/math">
+                    <m:oMathParaPr>
+                      <m:jc m:val="centerGroup"/>
+                    </m:oMathParaPr>
+                    <m:oMath xmlns:m="http://schemas.openxmlformats.org/officeDocument/2006/math">
+                      <m:r>
+                        <a:rPr lang="es-CO" i="1" smtClean="0">
+                          <a:latin typeface="Cambria Math" panose="02040503050406030204" pitchFamily="18" charset="0"/>
+                          <a:ea typeface="Cambria Math" panose="02040503050406030204" pitchFamily="18" charset="0"/>
+                        </a:rPr>
+                        <m:t>1</m:t>
+                      </m:r>
+                      <m:r>
+                        <a:rPr lang="es-CO" b="0" i="1" smtClean="0">
+                          <a:latin typeface="Cambria Math" panose="02040503050406030204" pitchFamily="18" charset="0"/>
+                          <a:ea typeface="Cambria Math" panose="02040503050406030204" pitchFamily="18" charset="0"/>
+                        </a:rPr>
+                        <m:t>−</m:t>
+                      </m:r>
+                      <m:f>
+                        <m:fPr>
+                          <m:ctrlPr>
+                            <a:rPr lang="es-CO" b="0" i="1" smtClean="0">
+                              <a:latin typeface="Cambria Math" panose="02040503050406030204" pitchFamily="18" charset="0"/>
+                              <a:ea typeface="Cambria Math" panose="02040503050406030204" pitchFamily="18" charset="0"/>
+                            </a:rPr>
+                          </m:ctrlPr>
+                        </m:fPr>
+                        <m:num>
+                          <m:sSup>
+                            <m:sSupPr>
+                              <m:ctrlPr>
+                                <a:rPr lang="es-CO" i="1">
+                                  <a:latin typeface="Cambria Math" panose="02040503050406030204" pitchFamily="18" charset="0"/>
+                                  <a:ea typeface="Cambria Math" panose="02040503050406030204" pitchFamily="18" charset="0"/>
+                                </a:rPr>
+                              </m:ctrlPr>
+                            </m:sSupPr>
+                            <m:e>
+                              <m:r>
+                                <a:rPr lang="es-CO" i="1">
+                                  <a:latin typeface="Cambria Math" panose="02040503050406030204" pitchFamily="18" charset="0"/>
+                                  <a:ea typeface="Cambria Math" panose="02040503050406030204" pitchFamily="18" charset="0"/>
+                                </a:rPr>
+                                <m:t>𝑟</m:t>
+                              </m:r>
+                            </m:e>
+                            <m:sup>
+                              <m:r>
+                                <a:rPr lang="es-CO" i="1">
+                                  <a:latin typeface="Cambria Math" panose="02040503050406030204" pitchFamily="18" charset="0"/>
+                                  <a:ea typeface="Cambria Math" panose="02040503050406030204" pitchFamily="18" charset="0"/>
+                                </a:rPr>
+                                <m:t>2</m:t>
+                              </m:r>
+                            </m:sup>
+                          </m:sSup>
+                        </m:num>
+                        <m:den>
+                          <m:sSup>
+                            <m:sSupPr>
+                              <m:ctrlPr>
+                                <a:rPr lang="es-CO" b="0" i="1" smtClean="0">
+                                  <a:latin typeface="Cambria Math" panose="02040503050406030204" pitchFamily="18" charset="0"/>
+                                  <a:ea typeface="Cambria Math" panose="02040503050406030204" pitchFamily="18" charset="0"/>
+                                </a:rPr>
+                              </m:ctrlPr>
+                            </m:sSupPr>
+                            <m:e>
+                              <m:sSub>
+                                <m:sSubPr>
+                                  <m:ctrlPr>
+                                    <a:rPr lang="es-CO" b="0" i="1" smtClean="0">
+                                      <a:latin typeface="Cambria Math" panose="02040503050406030204" pitchFamily="18" charset="0"/>
+                                      <a:ea typeface="Cambria Math" panose="02040503050406030204" pitchFamily="18" charset="0"/>
+                                    </a:rPr>
+                                  </m:ctrlPr>
+                                </m:sSubPr>
+                                <m:e>
+                                  <m:r>
+                                    <a:rPr lang="es-CO" b="0" i="1" smtClean="0">
+                                      <a:latin typeface="Cambria Math" panose="02040503050406030204" pitchFamily="18" charset="0"/>
+                                      <a:ea typeface="Cambria Math" panose="02040503050406030204" pitchFamily="18" charset="0"/>
+                                    </a:rPr>
+                                    <m:t>𝑅</m:t>
+                                  </m:r>
+                                </m:e>
+                                <m:sub>
+                                  <m:r>
+                                    <a:rPr lang="es-CO" b="0" i="1" smtClean="0">
+                                      <a:latin typeface="Cambria Math" panose="02040503050406030204" pitchFamily="18" charset="0"/>
+                                      <a:ea typeface="Cambria Math" panose="02040503050406030204" pitchFamily="18" charset="0"/>
+                                    </a:rPr>
+                                    <m:t>∗</m:t>
+                                  </m:r>
+                                </m:sub>
+                              </m:sSub>
+                            </m:e>
+                            <m:sup>
+                              <m:r>
+                                <a:rPr lang="es-CO" b="0" i="1" smtClean="0">
+                                  <a:latin typeface="Cambria Math" panose="02040503050406030204" pitchFamily="18" charset="0"/>
+                                  <a:ea typeface="Cambria Math" panose="02040503050406030204" pitchFamily="18" charset="0"/>
+                                </a:rPr>
+                                <m:t>2</m:t>
+                              </m:r>
+                            </m:sup>
+                          </m:sSup>
+                        </m:den>
+                      </m:f>
+                    </m:oMath>
+                  </m:oMathPara>
+                </a14:m>
+                <a:endParaRPr lang="es-CO" dirty="0"/>
+              </a:p>
+            </p:txBody>
+          </p:sp>
+        </mc:Choice>
+        <mc:Fallback>
+          <p:sp>
+            <p:nvSpPr>
+              <p:cNvPr id="18" name="CuadroTexto 17">
+                <a:extLst>
+                  <a:ext uri="{FF2B5EF4-FFF2-40B4-BE49-F238E27FC236}">
+                    <a16:creationId xmlns:a16="http://schemas.microsoft.com/office/drawing/2014/main" id="{6922637F-40B6-46CE-B549-A4EE0C2C5062}"/>
+                  </a:ext>
+                </a:extLst>
+              </p:cNvPr>
+              <p:cNvSpPr txBox="1">
+                <a:spLocks noRot="1" noChangeAspect="1" noMove="1" noResize="1" noEditPoints="1" noAdjustHandles="1" noChangeArrowheads="1" noChangeShapeType="1" noTextEdit="1"/>
+              </p:cNvSpPr>
+              <p:nvPr/>
+            </p:nvSpPr>
+            <p:spPr>
+              <a:xfrm>
+                <a:off x="1053430" y="2064372"/>
+                <a:ext cx="799000" cy="626133"/>
+              </a:xfrm>
+              <a:prstGeom prst="rect">
+                <a:avLst/>
+              </a:prstGeom>
+              <a:blipFill>
+                <a:blip r:embed="rId3"/>
+                <a:stretch>
+                  <a:fillRect/>
+                </a:stretch>
+              </a:blipFill>
+            </p:spPr>
+            <p:txBody>
+              <a:bodyPr/>
+              <a:lstStyle/>
+              <a:p>
+                <a:r>
+                  <a:rPr lang="es-CO">
+                    <a:noFill/>
+                  </a:rPr>
+                  <a:t> </a:t>
+                </a:r>
+              </a:p>
+            </p:txBody>
+          </p:sp>
+        </mc:Fallback>
+      </mc:AlternateContent>
+      <p:cxnSp>
+        <p:nvCxnSpPr>
+          <p:cNvPr id="20" name="Conector recto de flecha 19">
+            <a:extLst>
+              <a:ext uri="{FF2B5EF4-FFF2-40B4-BE49-F238E27FC236}">
+                <a16:creationId xmlns:a16="http://schemas.microsoft.com/office/drawing/2014/main" id="{0A436DB5-CE68-4022-A2A3-06FDBA29E361}"/>
+              </a:ext>
+            </a:extLst>
+          </p:cNvPr>
+          <p:cNvCxnSpPr>
+            <a:cxnSpLocks/>
+          </p:cNvCxnSpPr>
+          <p:nvPr/>
+        </p:nvCxnSpPr>
+        <p:spPr>
+          <a:xfrm>
+            <a:off x="933450" y="922908"/>
+            <a:ext cx="0" cy="1443531"/>
+          </a:xfrm>
+          <a:prstGeom prst="straightConnector1">
+            <a:avLst/>
+          </a:prstGeom>
+          <a:ln w="15875">
+            <a:solidFill>
+              <a:schemeClr val="tx1"/>
+            </a:solidFill>
+            <a:headEnd type="triangle"/>
+            <a:tailEnd type="triangle"/>
+          </a:ln>
+        </p:spPr>
+        <p:style>
+          <a:lnRef idx="1">
+            <a:schemeClr val="accent1"/>
+          </a:lnRef>
+          <a:fillRef idx="0">
+            <a:schemeClr val="accent1"/>
+          </a:fillRef>
+          <a:effectRef idx="0">
+            <a:schemeClr val="accent1"/>
+          </a:effectRef>
+          <a:fontRef idx="minor">
+            <a:schemeClr val="tx1"/>
+          </a:fontRef>
+        </p:style>
+      </p:cxnSp>
+      <mc:AlternateContent xmlns:mc="http://schemas.openxmlformats.org/markup-compatibility/2006">
+        <mc:Choice xmlns:a14="http://schemas.microsoft.com/office/drawing/2010/main" Requires="a14">
+          <p:sp>
+            <p:nvSpPr>
+              <p:cNvPr id="23" name="CuadroTexto 22">
+                <a:extLst>
+                  <a:ext uri="{FF2B5EF4-FFF2-40B4-BE49-F238E27FC236}">
+                    <a16:creationId xmlns:a16="http://schemas.microsoft.com/office/drawing/2014/main" id="{585F49A3-8F70-4E83-B024-F9326CE0BDCC}"/>
+                  </a:ext>
+                </a:extLst>
+              </p:cNvPr>
+              <p:cNvSpPr txBox="1"/>
+              <p:nvPr/>
+            </p:nvSpPr>
+            <p:spPr>
+              <a:xfrm>
+                <a:off x="276226" y="1205584"/>
+                <a:ext cx="657224" cy="718466"/>
+              </a:xfrm>
+              <a:prstGeom prst="rect">
+                <a:avLst/>
+              </a:prstGeom>
+              <a:noFill/>
+            </p:spPr>
+            <p:txBody>
+              <a:bodyPr wrap="square">
+                <a:spAutoFit/>
+              </a:bodyPr>
+              <a:lstStyle/>
+              <a:p>
+                <a:pPr/>
+                <a14:m>
+                  <m:oMathPara xmlns:m="http://schemas.openxmlformats.org/officeDocument/2006/math">
+                    <m:oMathParaPr>
+                      <m:jc m:val="centerGroup"/>
+                    </m:oMathParaPr>
+                    <m:oMath xmlns:m="http://schemas.openxmlformats.org/officeDocument/2006/math">
+                      <m:f>
+                        <m:fPr>
+                          <m:ctrlPr>
+                            <a:rPr lang="es-CO" b="0" i="1" smtClean="0">
+                              <a:latin typeface="Cambria Math" panose="02040503050406030204" pitchFamily="18" charset="0"/>
+                              <a:ea typeface="Cambria Math" panose="02040503050406030204" pitchFamily="18" charset="0"/>
+                            </a:rPr>
+                          </m:ctrlPr>
+                        </m:fPr>
+                        <m:num>
+                          <m:sSup>
+                            <m:sSupPr>
+                              <m:ctrlPr>
+                                <a:rPr lang="es-CO" i="1">
+                                  <a:latin typeface="Cambria Math" panose="02040503050406030204" pitchFamily="18" charset="0"/>
+                                  <a:ea typeface="Cambria Math" panose="02040503050406030204" pitchFamily="18" charset="0"/>
+                                </a:rPr>
+                              </m:ctrlPr>
+                            </m:sSupPr>
+                            <m:e>
+                              <m:r>
+                                <a:rPr lang="es-CO" i="1">
+                                  <a:latin typeface="Cambria Math" panose="02040503050406030204" pitchFamily="18" charset="0"/>
+                                  <a:ea typeface="Cambria Math" panose="02040503050406030204" pitchFamily="18" charset="0"/>
+                                </a:rPr>
+                                <m:t>𝑟</m:t>
+                              </m:r>
+                            </m:e>
+                            <m:sup>
+                              <m:r>
+                                <a:rPr lang="es-CO" i="1">
+                                  <a:latin typeface="Cambria Math" panose="02040503050406030204" pitchFamily="18" charset="0"/>
+                                  <a:ea typeface="Cambria Math" panose="02040503050406030204" pitchFamily="18" charset="0"/>
+                                </a:rPr>
+                                <m:t>2</m:t>
+                              </m:r>
+                            </m:sup>
+                          </m:sSup>
+                        </m:num>
+                        <m:den>
+                          <m:sSup>
+                            <m:sSupPr>
+                              <m:ctrlPr>
+                                <a:rPr lang="es-CO" b="0" i="1" smtClean="0">
+                                  <a:latin typeface="Cambria Math" panose="02040503050406030204" pitchFamily="18" charset="0"/>
+                                  <a:ea typeface="Cambria Math" panose="02040503050406030204" pitchFamily="18" charset="0"/>
+                                </a:rPr>
+                              </m:ctrlPr>
+                            </m:sSupPr>
+                            <m:e>
+                              <m:sSub>
+                                <m:sSubPr>
+                                  <m:ctrlPr>
+                                    <a:rPr lang="es-CO" b="0" i="1" smtClean="0">
+                                      <a:latin typeface="Cambria Math" panose="02040503050406030204" pitchFamily="18" charset="0"/>
+                                      <a:ea typeface="Cambria Math" panose="02040503050406030204" pitchFamily="18" charset="0"/>
+                                    </a:rPr>
+                                  </m:ctrlPr>
+                                </m:sSubPr>
+                                <m:e>
+                                  <m:r>
+                                    <a:rPr lang="es-CO" b="0" i="1" smtClean="0">
+                                      <a:latin typeface="Cambria Math" panose="02040503050406030204" pitchFamily="18" charset="0"/>
+                                      <a:ea typeface="Cambria Math" panose="02040503050406030204" pitchFamily="18" charset="0"/>
+                                    </a:rPr>
+                                    <m:t>𝑅</m:t>
+                                  </m:r>
+                                </m:e>
+                                <m:sub>
+                                  <m:r>
+                                    <a:rPr lang="es-CO" b="0" i="1" smtClean="0">
+                                      <a:latin typeface="Cambria Math" panose="02040503050406030204" pitchFamily="18" charset="0"/>
+                                      <a:ea typeface="Cambria Math" panose="02040503050406030204" pitchFamily="18" charset="0"/>
+                                    </a:rPr>
+                                    <m:t>∗</m:t>
+                                  </m:r>
+                                </m:sub>
+                              </m:sSub>
+                            </m:e>
+                            <m:sup>
+                              <m:r>
+                                <a:rPr lang="es-CO" b="0" i="1" smtClean="0">
+                                  <a:latin typeface="Cambria Math" panose="02040503050406030204" pitchFamily="18" charset="0"/>
+                                  <a:ea typeface="Cambria Math" panose="02040503050406030204" pitchFamily="18" charset="0"/>
+                                </a:rPr>
+                                <m:t>2</m:t>
+                              </m:r>
+                            </m:sup>
+                          </m:sSup>
+                        </m:den>
+                      </m:f>
+                    </m:oMath>
+                  </m:oMathPara>
+                </a14:m>
+                <a:endParaRPr lang="es-CO" dirty="0"/>
+              </a:p>
+            </p:txBody>
+          </p:sp>
+        </mc:Choice>
+        <mc:Fallback>
+          <p:sp>
+            <p:nvSpPr>
+              <p:cNvPr id="23" name="CuadroTexto 22">
+                <a:extLst>
+                  <a:ext uri="{FF2B5EF4-FFF2-40B4-BE49-F238E27FC236}">
+                    <a16:creationId xmlns:a16="http://schemas.microsoft.com/office/drawing/2014/main" id="{585F49A3-8F70-4E83-B024-F9326CE0BDCC}"/>
+                  </a:ext>
+                </a:extLst>
+              </p:cNvPr>
+              <p:cNvSpPr txBox="1">
+                <a:spLocks noRot="1" noChangeAspect="1" noMove="1" noResize="1" noEditPoints="1" noAdjustHandles="1" noChangeArrowheads="1" noChangeShapeType="1" noTextEdit="1"/>
+              </p:cNvSpPr>
+              <p:nvPr/>
+            </p:nvSpPr>
+            <p:spPr>
+              <a:xfrm>
+                <a:off x="276226" y="1205584"/>
+                <a:ext cx="657224" cy="718466"/>
+              </a:xfrm>
+              <a:prstGeom prst="rect">
+                <a:avLst/>
+              </a:prstGeom>
+              <a:blipFill>
+                <a:blip r:embed="rId4"/>
+                <a:stretch>
+                  <a:fillRect/>
+                </a:stretch>
+              </a:blipFill>
+            </p:spPr>
+            <p:txBody>
+              <a:bodyPr/>
+              <a:lstStyle/>
+              <a:p>
+                <a:r>
+                  <a:rPr lang="es-CO">
+                    <a:noFill/>
+                  </a:rPr>
+                  <a:t> </a:t>
+                </a:r>
+              </a:p>
+            </p:txBody>
+          </p:sp>
+        </mc:Fallback>
+      </mc:AlternateContent>
+      <p:cxnSp>
+        <p:nvCxnSpPr>
+          <p:cNvPr id="25" name="Conector recto de flecha 24">
+            <a:extLst>
+              <a:ext uri="{FF2B5EF4-FFF2-40B4-BE49-F238E27FC236}">
+                <a16:creationId xmlns:a16="http://schemas.microsoft.com/office/drawing/2014/main" id="{9957AF16-A945-47B7-9910-154B4F26CFAA}"/>
+              </a:ext>
+            </a:extLst>
+          </p:cNvPr>
+          <p:cNvCxnSpPr>
+            <a:cxnSpLocks/>
+          </p:cNvCxnSpPr>
+          <p:nvPr/>
+        </p:nvCxnSpPr>
+        <p:spPr>
+          <a:xfrm flipV="1">
+            <a:off x="1146693" y="3400850"/>
+            <a:ext cx="0" cy="1950097"/>
+          </a:xfrm>
+          <a:prstGeom prst="straightConnector1">
+            <a:avLst/>
+          </a:prstGeom>
+          <a:ln w="19050">
+            <a:solidFill>
+              <a:schemeClr val="tx1"/>
+            </a:solidFill>
+            <a:tailEnd type="triangle"/>
+          </a:ln>
+        </p:spPr>
+        <p:style>
+          <a:lnRef idx="1">
+            <a:schemeClr val="accent1"/>
+          </a:lnRef>
+          <a:fillRef idx="0">
+            <a:schemeClr val="accent1"/>
+          </a:fillRef>
+          <a:effectRef idx="0">
+            <a:schemeClr val="accent1"/>
+          </a:effectRef>
+          <a:fontRef idx="minor">
+            <a:schemeClr val="tx1"/>
+          </a:fontRef>
+        </p:style>
+      </p:cxnSp>
+      <p:cxnSp>
+        <p:nvCxnSpPr>
+          <p:cNvPr id="26" name="Conector recto de flecha 25">
+            <a:extLst>
+              <a:ext uri="{FF2B5EF4-FFF2-40B4-BE49-F238E27FC236}">
+                <a16:creationId xmlns:a16="http://schemas.microsoft.com/office/drawing/2014/main" id="{E33BFE99-88B2-4943-A297-C38FA838863F}"/>
+              </a:ext>
+            </a:extLst>
+          </p:cNvPr>
+          <p:cNvCxnSpPr>
+            <a:cxnSpLocks/>
+          </p:cNvCxnSpPr>
+          <p:nvPr/>
+        </p:nvCxnSpPr>
+        <p:spPr>
+          <a:xfrm>
+            <a:off x="1146693" y="5350947"/>
+            <a:ext cx="5863707" cy="0"/>
+          </a:xfrm>
+          <a:prstGeom prst="straightConnector1">
+            <a:avLst/>
+          </a:prstGeom>
+          <a:ln w="19050">
+            <a:solidFill>
+              <a:schemeClr val="tx1"/>
+            </a:solidFill>
+            <a:tailEnd type="triangle"/>
+          </a:ln>
+        </p:spPr>
+        <p:style>
+          <a:lnRef idx="1">
+            <a:schemeClr val="accent1"/>
+          </a:lnRef>
+          <a:fillRef idx="0">
+            <a:schemeClr val="accent1"/>
+          </a:fillRef>
+          <a:effectRef idx="0">
+            <a:schemeClr val="accent1"/>
+          </a:effectRef>
+          <a:fontRef idx="minor">
+            <a:schemeClr val="tx1"/>
+          </a:fontRef>
+        </p:style>
+      </p:cxnSp>
+      <p:grpSp>
+        <p:nvGrpSpPr>
+          <p:cNvPr id="27" name="Grupo 26">
+            <a:extLst>
+              <a:ext uri="{FF2B5EF4-FFF2-40B4-BE49-F238E27FC236}">
+                <a16:creationId xmlns:a16="http://schemas.microsoft.com/office/drawing/2014/main" id="{77E72872-3B68-4BCE-863C-C9CCBA0663C1}"/>
+              </a:ext>
+            </a:extLst>
+          </p:cNvPr>
+          <p:cNvGrpSpPr/>
+          <p:nvPr/>
+        </p:nvGrpSpPr>
+        <p:grpSpPr>
+          <a:xfrm>
+            <a:off x="1150192" y="3701114"/>
+            <a:ext cx="1516805" cy="1462175"/>
+            <a:chOff x="720713" y="592654"/>
+            <a:chExt cx="4109034" cy="1160645"/>
+          </a:xfrm>
+        </p:grpSpPr>
+        <p:sp>
+          <p:nvSpPr>
+            <p:cNvPr id="28" name="Forma libre: forma 27">
+              <a:extLst>
+                <a:ext uri="{FF2B5EF4-FFF2-40B4-BE49-F238E27FC236}">
+                  <a16:creationId xmlns:a16="http://schemas.microsoft.com/office/drawing/2014/main" id="{CB92822A-669C-4290-9942-59739F94B5BC}"/>
+                </a:ext>
+              </a:extLst>
+            </p:cNvPr>
+            <p:cNvSpPr/>
+            <p:nvPr/>
+          </p:nvSpPr>
+          <p:spPr>
+            <a:xfrm>
+              <a:off x="720713" y="592654"/>
+              <a:ext cx="2148321" cy="1160645"/>
+            </a:xfrm>
+            <a:custGeom>
+              <a:avLst/>
+              <a:gdLst>
+                <a:gd name="connsiteX0" fmla="*/ 0 w 2013358"/>
+                <a:gd name="connsiteY0" fmla="*/ 0 h 1208015"/>
+                <a:gd name="connsiteX1" fmla="*/ 545284 w 2013358"/>
+                <a:gd name="connsiteY1" fmla="*/ 536896 h 1208015"/>
+                <a:gd name="connsiteX2" fmla="*/ 1082180 w 2013358"/>
+                <a:gd name="connsiteY2" fmla="*/ 1124125 h 1208015"/>
+                <a:gd name="connsiteX3" fmla="*/ 2013358 w 2013358"/>
+                <a:gd name="connsiteY3" fmla="*/ 1208015 h 1208015"/>
+                <a:gd name="connsiteX0" fmla="*/ 0 w 2013358"/>
+                <a:gd name="connsiteY0" fmla="*/ 0 h 1208015"/>
+                <a:gd name="connsiteX1" fmla="*/ 654341 w 2013358"/>
+                <a:gd name="connsiteY1" fmla="*/ 411061 h 1208015"/>
+                <a:gd name="connsiteX2" fmla="*/ 1082180 w 2013358"/>
+                <a:gd name="connsiteY2" fmla="*/ 1124125 h 1208015"/>
+                <a:gd name="connsiteX3" fmla="*/ 2013358 w 2013358"/>
+                <a:gd name="connsiteY3" fmla="*/ 1208015 h 1208015"/>
+                <a:gd name="connsiteX0" fmla="*/ 0 w 2013358"/>
+                <a:gd name="connsiteY0" fmla="*/ 0 h 1208015"/>
+                <a:gd name="connsiteX1" fmla="*/ 738231 w 2013358"/>
+                <a:gd name="connsiteY1" fmla="*/ 192947 h 1208015"/>
+                <a:gd name="connsiteX2" fmla="*/ 1082180 w 2013358"/>
+                <a:gd name="connsiteY2" fmla="*/ 1124125 h 1208015"/>
+                <a:gd name="connsiteX3" fmla="*/ 2013358 w 2013358"/>
+                <a:gd name="connsiteY3" fmla="*/ 1208015 h 1208015"/>
+                <a:gd name="connsiteX0" fmla="*/ 0 w 2021747"/>
+                <a:gd name="connsiteY0" fmla="*/ 0 h 1149292"/>
+                <a:gd name="connsiteX1" fmla="*/ 746620 w 2021747"/>
+                <a:gd name="connsiteY1" fmla="*/ 134224 h 1149292"/>
+                <a:gd name="connsiteX2" fmla="*/ 1090569 w 2021747"/>
+                <a:gd name="connsiteY2" fmla="*/ 1065402 h 1149292"/>
+                <a:gd name="connsiteX3" fmla="*/ 2021747 w 2021747"/>
+                <a:gd name="connsiteY3" fmla="*/ 1149292 h 1149292"/>
+                <a:gd name="connsiteX0" fmla="*/ 0 w 2021747"/>
+                <a:gd name="connsiteY0" fmla="*/ 5285 h 1154577"/>
+                <a:gd name="connsiteX1" fmla="*/ 746620 w 2021747"/>
+                <a:gd name="connsiteY1" fmla="*/ 139509 h 1154577"/>
+                <a:gd name="connsiteX2" fmla="*/ 1090569 w 2021747"/>
+                <a:gd name="connsiteY2" fmla="*/ 1070687 h 1154577"/>
+                <a:gd name="connsiteX3" fmla="*/ 2021747 w 2021747"/>
+                <a:gd name="connsiteY3" fmla="*/ 1154577 h 1154577"/>
+                <a:gd name="connsiteX0" fmla="*/ 0 w 2148321"/>
+                <a:gd name="connsiteY0" fmla="*/ 3792 h 1160645"/>
+                <a:gd name="connsiteX1" fmla="*/ 873194 w 2148321"/>
+                <a:gd name="connsiteY1" fmla="*/ 145577 h 1160645"/>
+                <a:gd name="connsiteX2" fmla="*/ 1217143 w 2148321"/>
+                <a:gd name="connsiteY2" fmla="*/ 1076755 h 1160645"/>
+                <a:gd name="connsiteX3" fmla="*/ 2148321 w 2148321"/>
+                <a:gd name="connsiteY3" fmla="*/ 1160645 h 1160645"/>
+              </a:gdLst>
+              <a:ahLst/>
+              <a:cxnLst>
+                <a:cxn ang="0">
+                  <a:pos x="connsiteX0" y="connsiteY0"/>
+                </a:cxn>
+                <a:cxn ang="0">
+                  <a:pos x="connsiteX1" y="connsiteY1"/>
+                </a:cxn>
+                <a:cxn ang="0">
+                  <a:pos x="connsiteX2" y="connsiteY2"/>
+                </a:cxn>
+                <a:cxn ang="0">
+                  <a:pos x="connsiteX3" y="connsiteY3"/>
+                </a:cxn>
+              </a:cxnLst>
+              <a:rect l="l" t="t" r="r" b="b"/>
+              <a:pathLst>
+                <a:path w="2148321" h="1160645">
+                  <a:moveTo>
+                    <a:pt x="0" y="3792"/>
+                  </a:moveTo>
+                  <a:cubicBezTo>
+                    <a:pt x="358629" y="2394"/>
+                    <a:pt x="670337" y="-33250"/>
+                    <a:pt x="873194" y="145577"/>
+                  </a:cubicBezTo>
+                  <a:cubicBezTo>
+                    <a:pt x="1076051" y="324404"/>
+                    <a:pt x="972464" y="964902"/>
+                    <a:pt x="1217143" y="1076755"/>
+                  </a:cubicBezTo>
+                  <a:cubicBezTo>
+                    <a:pt x="1461822" y="1188608"/>
+                    <a:pt x="1946985" y="1142469"/>
+                    <a:pt x="2148321" y="1160645"/>
+                  </a:cubicBezTo>
+                </a:path>
+              </a:pathLst>
+            </a:custGeom>
+            <a:noFill/>
+            <a:ln w="28575">
+              <a:solidFill>
+                <a:schemeClr val="tx1"/>
+              </a:solidFill>
+            </a:ln>
+          </p:spPr>
+          <p:style>
+            <a:lnRef idx="2">
+              <a:schemeClr val="accent1">
+                <a:shade val="50000"/>
+              </a:schemeClr>
+            </a:lnRef>
+            <a:fillRef idx="1">
+              <a:schemeClr val="accent1"/>
+            </a:fillRef>
+            <a:effectRef idx="0">
+              <a:schemeClr val="accent1"/>
+            </a:effectRef>
+            <a:fontRef idx="minor">
+              <a:schemeClr val="lt1"/>
+            </a:fontRef>
+          </p:style>
+          <p:txBody>
+            <a:bodyPr rtlCol="0" anchor="ctr"/>
+            <a:lstStyle/>
+            <a:p>
+              <a:pPr algn="ctr"/>
+              <a:endParaRPr lang="es-CO" dirty="0"/>
+            </a:p>
+          </p:txBody>
+        </p:sp>
+        <p:sp>
+          <p:nvSpPr>
+            <p:cNvPr id="29" name="Forma libre: forma 28">
+              <a:extLst>
+                <a:ext uri="{FF2B5EF4-FFF2-40B4-BE49-F238E27FC236}">
+                  <a16:creationId xmlns:a16="http://schemas.microsoft.com/office/drawing/2014/main" id="{2DD3BE76-9135-4D98-9FBC-BCFE9AF5AE28}"/>
+                </a:ext>
+              </a:extLst>
+            </p:cNvPr>
+            <p:cNvSpPr/>
+            <p:nvPr/>
+          </p:nvSpPr>
+          <p:spPr>
+            <a:xfrm flipH="1">
+              <a:off x="2808000" y="598722"/>
+              <a:ext cx="2021747" cy="1154577"/>
+            </a:xfrm>
+            <a:custGeom>
+              <a:avLst/>
+              <a:gdLst>
+                <a:gd name="connsiteX0" fmla="*/ 0 w 2013358"/>
+                <a:gd name="connsiteY0" fmla="*/ 0 h 1208015"/>
+                <a:gd name="connsiteX1" fmla="*/ 545284 w 2013358"/>
+                <a:gd name="connsiteY1" fmla="*/ 536896 h 1208015"/>
+                <a:gd name="connsiteX2" fmla="*/ 1082180 w 2013358"/>
+                <a:gd name="connsiteY2" fmla="*/ 1124125 h 1208015"/>
+                <a:gd name="connsiteX3" fmla="*/ 2013358 w 2013358"/>
+                <a:gd name="connsiteY3" fmla="*/ 1208015 h 1208015"/>
+                <a:gd name="connsiteX0" fmla="*/ 0 w 2013358"/>
+                <a:gd name="connsiteY0" fmla="*/ 0 h 1208015"/>
+                <a:gd name="connsiteX1" fmla="*/ 654341 w 2013358"/>
+                <a:gd name="connsiteY1" fmla="*/ 411061 h 1208015"/>
+                <a:gd name="connsiteX2" fmla="*/ 1082180 w 2013358"/>
+                <a:gd name="connsiteY2" fmla="*/ 1124125 h 1208015"/>
+                <a:gd name="connsiteX3" fmla="*/ 2013358 w 2013358"/>
+                <a:gd name="connsiteY3" fmla="*/ 1208015 h 1208015"/>
+                <a:gd name="connsiteX0" fmla="*/ 0 w 2013358"/>
+                <a:gd name="connsiteY0" fmla="*/ 0 h 1208015"/>
+                <a:gd name="connsiteX1" fmla="*/ 738231 w 2013358"/>
+                <a:gd name="connsiteY1" fmla="*/ 192947 h 1208015"/>
+                <a:gd name="connsiteX2" fmla="*/ 1082180 w 2013358"/>
+                <a:gd name="connsiteY2" fmla="*/ 1124125 h 1208015"/>
+                <a:gd name="connsiteX3" fmla="*/ 2013358 w 2013358"/>
+                <a:gd name="connsiteY3" fmla="*/ 1208015 h 1208015"/>
+                <a:gd name="connsiteX0" fmla="*/ 0 w 2021747"/>
+                <a:gd name="connsiteY0" fmla="*/ 0 h 1149292"/>
+                <a:gd name="connsiteX1" fmla="*/ 746620 w 2021747"/>
+                <a:gd name="connsiteY1" fmla="*/ 134224 h 1149292"/>
+                <a:gd name="connsiteX2" fmla="*/ 1090569 w 2021747"/>
+                <a:gd name="connsiteY2" fmla="*/ 1065402 h 1149292"/>
+                <a:gd name="connsiteX3" fmla="*/ 2021747 w 2021747"/>
+                <a:gd name="connsiteY3" fmla="*/ 1149292 h 1149292"/>
+                <a:gd name="connsiteX0" fmla="*/ 0 w 2021747"/>
+                <a:gd name="connsiteY0" fmla="*/ 5285 h 1154577"/>
+                <a:gd name="connsiteX1" fmla="*/ 746620 w 2021747"/>
+                <a:gd name="connsiteY1" fmla="*/ 139509 h 1154577"/>
+                <a:gd name="connsiteX2" fmla="*/ 1090569 w 2021747"/>
+                <a:gd name="connsiteY2" fmla="*/ 1070687 h 1154577"/>
+                <a:gd name="connsiteX3" fmla="*/ 2021747 w 2021747"/>
+                <a:gd name="connsiteY3" fmla="*/ 1154577 h 1154577"/>
+              </a:gdLst>
+              <a:ahLst/>
+              <a:cxnLst>
+                <a:cxn ang="0">
+                  <a:pos x="connsiteX0" y="connsiteY0"/>
+                </a:cxn>
+                <a:cxn ang="0">
+                  <a:pos x="connsiteX1" y="connsiteY1"/>
+                </a:cxn>
+                <a:cxn ang="0">
+                  <a:pos x="connsiteX2" y="connsiteY2"/>
+                </a:cxn>
+                <a:cxn ang="0">
+                  <a:pos x="connsiteX3" y="connsiteY3"/>
+                </a:cxn>
+              </a:cxnLst>
+              <a:rect l="l" t="t" r="r" b="b"/>
+              <a:pathLst>
+                <a:path w="2021747" h="1154577">
+                  <a:moveTo>
+                    <a:pt x="0" y="5285"/>
+                  </a:moveTo>
+                  <a:cubicBezTo>
+                    <a:pt x="358629" y="3887"/>
+                    <a:pt x="564859" y="-38058"/>
+                    <a:pt x="746620" y="139509"/>
+                  </a:cubicBezTo>
+                  <a:cubicBezTo>
+                    <a:pt x="928381" y="317076"/>
+                    <a:pt x="845890" y="958834"/>
+                    <a:pt x="1090569" y="1070687"/>
+                  </a:cubicBezTo>
+                  <a:cubicBezTo>
+                    <a:pt x="1335248" y="1182540"/>
+                    <a:pt x="1820411" y="1136401"/>
+                    <a:pt x="2021747" y="1154577"/>
+                  </a:cubicBezTo>
+                </a:path>
+              </a:pathLst>
+            </a:custGeom>
+            <a:noFill/>
+            <a:ln w="28575">
+              <a:solidFill>
+                <a:schemeClr val="tx1"/>
+              </a:solidFill>
+            </a:ln>
+          </p:spPr>
+          <p:style>
+            <a:lnRef idx="2">
+              <a:schemeClr val="accent1">
+                <a:shade val="50000"/>
+              </a:schemeClr>
+            </a:lnRef>
+            <a:fillRef idx="1">
+              <a:schemeClr val="accent1"/>
+            </a:fillRef>
+            <a:effectRef idx="0">
+              <a:schemeClr val="accent1"/>
+            </a:effectRef>
+            <a:fontRef idx="minor">
+              <a:schemeClr val="lt1"/>
+            </a:fontRef>
+          </p:style>
+          <p:txBody>
+            <a:bodyPr rtlCol="0" anchor="ctr"/>
+            <a:lstStyle/>
+            <a:p>
+              <a:pPr algn="ctr"/>
+              <a:endParaRPr lang="es-CO"/>
+            </a:p>
+          </p:txBody>
+        </p:sp>
+      </p:grpSp>
+      <p:grpSp>
+        <p:nvGrpSpPr>
+          <p:cNvPr id="30" name="Grupo 29">
+            <a:extLst>
+              <a:ext uri="{FF2B5EF4-FFF2-40B4-BE49-F238E27FC236}">
+                <a16:creationId xmlns:a16="http://schemas.microsoft.com/office/drawing/2014/main" id="{47374334-A8D6-47A9-842A-925420FA1708}"/>
+              </a:ext>
+            </a:extLst>
+          </p:cNvPr>
+          <p:cNvGrpSpPr/>
+          <p:nvPr/>
+        </p:nvGrpSpPr>
+        <p:grpSpPr>
+          <a:xfrm>
+            <a:off x="5176216" y="3708758"/>
+            <a:ext cx="1516805" cy="1462175"/>
+            <a:chOff x="720713" y="592654"/>
+            <a:chExt cx="4109034" cy="1160645"/>
+          </a:xfrm>
+        </p:grpSpPr>
+        <p:sp>
+          <p:nvSpPr>
+            <p:cNvPr id="31" name="Forma libre: forma 30">
+              <a:extLst>
+                <a:ext uri="{FF2B5EF4-FFF2-40B4-BE49-F238E27FC236}">
+                  <a16:creationId xmlns:a16="http://schemas.microsoft.com/office/drawing/2014/main" id="{E8D404C2-AFDC-448F-884B-E00BD68B8ED6}"/>
+                </a:ext>
+              </a:extLst>
+            </p:cNvPr>
+            <p:cNvSpPr/>
+            <p:nvPr/>
+          </p:nvSpPr>
+          <p:spPr>
+            <a:xfrm>
+              <a:off x="720713" y="592654"/>
+              <a:ext cx="2148321" cy="1160645"/>
+            </a:xfrm>
+            <a:custGeom>
+              <a:avLst/>
+              <a:gdLst>
+                <a:gd name="connsiteX0" fmla="*/ 0 w 2013358"/>
+                <a:gd name="connsiteY0" fmla="*/ 0 h 1208015"/>
+                <a:gd name="connsiteX1" fmla="*/ 545284 w 2013358"/>
+                <a:gd name="connsiteY1" fmla="*/ 536896 h 1208015"/>
+                <a:gd name="connsiteX2" fmla="*/ 1082180 w 2013358"/>
+                <a:gd name="connsiteY2" fmla="*/ 1124125 h 1208015"/>
+                <a:gd name="connsiteX3" fmla="*/ 2013358 w 2013358"/>
+                <a:gd name="connsiteY3" fmla="*/ 1208015 h 1208015"/>
+                <a:gd name="connsiteX0" fmla="*/ 0 w 2013358"/>
+                <a:gd name="connsiteY0" fmla="*/ 0 h 1208015"/>
+                <a:gd name="connsiteX1" fmla="*/ 654341 w 2013358"/>
+                <a:gd name="connsiteY1" fmla="*/ 411061 h 1208015"/>
+                <a:gd name="connsiteX2" fmla="*/ 1082180 w 2013358"/>
+                <a:gd name="connsiteY2" fmla="*/ 1124125 h 1208015"/>
+                <a:gd name="connsiteX3" fmla="*/ 2013358 w 2013358"/>
+                <a:gd name="connsiteY3" fmla="*/ 1208015 h 1208015"/>
+                <a:gd name="connsiteX0" fmla="*/ 0 w 2013358"/>
+                <a:gd name="connsiteY0" fmla="*/ 0 h 1208015"/>
+                <a:gd name="connsiteX1" fmla="*/ 738231 w 2013358"/>
+                <a:gd name="connsiteY1" fmla="*/ 192947 h 1208015"/>
+                <a:gd name="connsiteX2" fmla="*/ 1082180 w 2013358"/>
+                <a:gd name="connsiteY2" fmla="*/ 1124125 h 1208015"/>
+                <a:gd name="connsiteX3" fmla="*/ 2013358 w 2013358"/>
+                <a:gd name="connsiteY3" fmla="*/ 1208015 h 1208015"/>
+                <a:gd name="connsiteX0" fmla="*/ 0 w 2021747"/>
+                <a:gd name="connsiteY0" fmla="*/ 0 h 1149292"/>
+                <a:gd name="connsiteX1" fmla="*/ 746620 w 2021747"/>
+                <a:gd name="connsiteY1" fmla="*/ 134224 h 1149292"/>
+                <a:gd name="connsiteX2" fmla="*/ 1090569 w 2021747"/>
+                <a:gd name="connsiteY2" fmla="*/ 1065402 h 1149292"/>
+                <a:gd name="connsiteX3" fmla="*/ 2021747 w 2021747"/>
+                <a:gd name="connsiteY3" fmla="*/ 1149292 h 1149292"/>
+                <a:gd name="connsiteX0" fmla="*/ 0 w 2021747"/>
+                <a:gd name="connsiteY0" fmla="*/ 5285 h 1154577"/>
+                <a:gd name="connsiteX1" fmla="*/ 746620 w 2021747"/>
+                <a:gd name="connsiteY1" fmla="*/ 139509 h 1154577"/>
+                <a:gd name="connsiteX2" fmla="*/ 1090569 w 2021747"/>
+                <a:gd name="connsiteY2" fmla="*/ 1070687 h 1154577"/>
+                <a:gd name="connsiteX3" fmla="*/ 2021747 w 2021747"/>
+                <a:gd name="connsiteY3" fmla="*/ 1154577 h 1154577"/>
+                <a:gd name="connsiteX0" fmla="*/ 0 w 2148321"/>
+                <a:gd name="connsiteY0" fmla="*/ 3792 h 1160645"/>
+                <a:gd name="connsiteX1" fmla="*/ 873194 w 2148321"/>
+                <a:gd name="connsiteY1" fmla="*/ 145577 h 1160645"/>
+                <a:gd name="connsiteX2" fmla="*/ 1217143 w 2148321"/>
+                <a:gd name="connsiteY2" fmla="*/ 1076755 h 1160645"/>
+                <a:gd name="connsiteX3" fmla="*/ 2148321 w 2148321"/>
+                <a:gd name="connsiteY3" fmla="*/ 1160645 h 1160645"/>
+              </a:gdLst>
+              <a:ahLst/>
+              <a:cxnLst>
+                <a:cxn ang="0">
+                  <a:pos x="connsiteX0" y="connsiteY0"/>
+                </a:cxn>
+                <a:cxn ang="0">
+                  <a:pos x="connsiteX1" y="connsiteY1"/>
+                </a:cxn>
+                <a:cxn ang="0">
+                  <a:pos x="connsiteX2" y="connsiteY2"/>
+                </a:cxn>
+                <a:cxn ang="0">
+                  <a:pos x="connsiteX3" y="connsiteY3"/>
+                </a:cxn>
+              </a:cxnLst>
+              <a:rect l="l" t="t" r="r" b="b"/>
+              <a:pathLst>
+                <a:path w="2148321" h="1160645">
+                  <a:moveTo>
+                    <a:pt x="0" y="3792"/>
+                  </a:moveTo>
+                  <a:cubicBezTo>
+                    <a:pt x="358629" y="2394"/>
+                    <a:pt x="670337" y="-33250"/>
+                    <a:pt x="873194" y="145577"/>
+                  </a:cubicBezTo>
+                  <a:cubicBezTo>
+                    <a:pt x="1076051" y="324404"/>
+                    <a:pt x="972464" y="964902"/>
+                    <a:pt x="1217143" y="1076755"/>
+                  </a:cubicBezTo>
+                  <a:cubicBezTo>
+                    <a:pt x="1461822" y="1188608"/>
+                    <a:pt x="1946985" y="1142469"/>
+                    <a:pt x="2148321" y="1160645"/>
+                  </a:cubicBezTo>
+                </a:path>
+              </a:pathLst>
+            </a:custGeom>
+            <a:noFill/>
+            <a:ln w="28575">
+              <a:solidFill>
+                <a:schemeClr val="tx1"/>
+              </a:solidFill>
+            </a:ln>
+          </p:spPr>
+          <p:style>
+            <a:lnRef idx="2">
+              <a:schemeClr val="accent1">
+                <a:shade val="50000"/>
+              </a:schemeClr>
+            </a:lnRef>
+            <a:fillRef idx="1">
+              <a:schemeClr val="accent1"/>
+            </a:fillRef>
+            <a:effectRef idx="0">
+              <a:schemeClr val="accent1"/>
+            </a:effectRef>
+            <a:fontRef idx="minor">
+              <a:schemeClr val="lt1"/>
+            </a:fontRef>
+          </p:style>
+          <p:txBody>
+            <a:bodyPr rtlCol="0" anchor="ctr"/>
+            <a:lstStyle/>
+            <a:p>
+              <a:pPr algn="ctr"/>
+              <a:endParaRPr lang="es-CO" dirty="0"/>
+            </a:p>
+          </p:txBody>
+        </p:sp>
+        <p:sp>
+          <p:nvSpPr>
+            <p:cNvPr id="32" name="Forma libre: forma 31">
+              <a:extLst>
+                <a:ext uri="{FF2B5EF4-FFF2-40B4-BE49-F238E27FC236}">
+                  <a16:creationId xmlns:a16="http://schemas.microsoft.com/office/drawing/2014/main" id="{895B1DE7-0C8C-4D5D-B1F3-C67FE11CC72C}"/>
+                </a:ext>
+              </a:extLst>
+            </p:cNvPr>
+            <p:cNvSpPr/>
+            <p:nvPr/>
+          </p:nvSpPr>
+          <p:spPr>
+            <a:xfrm flipH="1">
+              <a:off x="2808000" y="598722"/>
+              <a:ext cx="2021747" cy="1154577"/>
+            </a:xfrm>
+            <a:custGeom>
+              <a:avLst/>
+              <a:gdLst>
+                <a:gd name="connsiteX0" fmla="*/ 0 w 2013358"/>
+                <a:gd name="connsiteY0" fmla="*/ 0 h 1208015"/>
+                <a:gd name="connsiteX1" fmla="*/ 545284 w 2013358"/>
+                <a:gd name="connsiteY1" fmla="*/ 536896 h 1208015"/>
+                <a:gd name="connsiteX2" fmla="*/ 1082180 w 2013358"/>
+                <a:gd name="connsiteY2" fmla="*/ 1124125 h 1208015"/>
+                <a:gd name="connsiteX3" fmla="*/ 2013358 w 2013358"/>
+                <a:gd name="connsiteY3" fmla="*/ 1208015 h 1208015"/>
+                <a:gd name="connsiteX0" fmla="*/ 0 w 2013358"/>
+                <a:gd name="connsiteY0" fmla="*/ 0 h 1208015"/>
+                <a:gd name="connsiteX1" fmla="*/ 654341 w 2013358"/>
+                <a:gd name="connsiteY1" fmla="*/ 411061 h 1208015"/>
+                <a:gd name="connsiteX2" fmla="*/ 1082180 w 2013358"/>
+                <a:gd name="connsiteY2" fmla="*/ 1124125 h 1208015"/>
+                <a:gd name="connsiteX3" fmla="*/ 2013358 w 2013358"/>
+                <a:gd name="connsiteY3" fmla="*/ 1208015 h 1208015"/>
+                <a:gd name="connsiteX0" fmla="*/ 0 w 2013358"/>
+                <a:gd name="connsiteY0" fmla="*/ 0 h 1208015"/>
+                <a:gd name="connsiteX1" fmla="*/ 738231 w 2013358"/>
+                <a:gd name="connsiteY1" fmla="*/ 192947 h 1208015"/>
+                <a:gd name="connsiteX2" fmla="*/ 1082180 w 2013358"/>
+                <a:gd name="connsiteY2" fmla="*/ 1124125 h 1208015"/>
+                <a:gd name="connsiteX3" fmla="*/ 2013358 w 2013358"/>
+                <a:gd name="connsiteY3" fmla="*/ 1208015 h 1208015"/>
+                <a:gd name="connsiteX0" fmla="*/ 0 w 2021747"/>
+                <a:gd name="connsiteY0" fmla="*/ 0 h 1149292"/>
+                <a:gd name="connsiteX1" fmla="*/ 746620 w 2021747"/>
+                <a:gd name="connsiteY1" fmla="*/ 134224 h 1149292"/>
+                <a:gd name="connsiteX2" fmla="*/ 1090569 w 2021747"/>
+                <a:gd name="connsiteY2" fmla="*/ 1065402 h 1149292"/>
+                <a:gd name="connsiteX3" fmla="*/ 2021747 w 2021747"/>
+                <a:gd name="connsiteY3" fmla="*/ 1149292 h 1149292"/>
+                <a:gd name="connsiteX0" fmla="*/ 0 w 2021747"/>
+                <a:gd name="connsiteY0" fmla="*/ 5285 h 1154577"/>
+                <a:gd name="connsiteX1" fmla="*/ 746620 w 2021747"/>
+                <a:gd name="connsiteY1" fmla="*/ 139509 h 1154577"/>
+                <a:gd name="connsiteX2" fmla="*/ 1090569 w 2021747"/>
+                <a:gd name="connsiteY2" fmla="*/ 1070687 h 1154577"/>
+                <a:gd name="connsiteX3" fmla="*/ 2021747 w 2021747"/>
+                <a:gd name="connsiteY3" fmla="*/ 1154577 h 1154577"/>
+              </a:gdLst>
+              <a:ahLst/>
+              <a:cxnLst>
+                <a:cxn ang="0">
+                  <a:pos x="connsiteX0" y="connsiteY0"/>
+                </a:cxn>
+                <a:cxn ang="0">
+                  <a:pos x="connsiteX1" y="connsiteY1"/>
+                </a:cxn>
+                <a:cxn ang="0">
+                  <a:pos x="connsiteX2" y="connsiteY2"/>
+                </a:cxn>
+                <a:cxn ang="0">
+                  <a:pos x="connsiteX3" y="connsiteY3"/>
+                </a:cxn>
+              </a:cxnLst>
+              <a:rect l="l" t="t" r="r" b="b"/>
+              <a:pathLst>
+                <a:path w="2021747" h="1154577">
+                  <a:moveTo>
+                    <a:pt x="0" y="5285"/>
+                  </a:moveTo>
+                  <a:cubicBezTo>
+                    <a:pt x="358629" y="3887"/>
+                    <a:pt x="564859" y="-38058"/>
+                    <a:pt x="746620" y="139509"/>
+                  </a:cubicBezTo>
+                  <a:cubicBezTo>
+                    <a:pt x="928381" y="317076"/>
+                    <a:pt x="845890" y="958834"/>
+                    <a:pt x="1090569" y="1070687"/>
+                  </a:cubicBezTo>
+                  <a:cubicBezTo>
+                    <a:pt x="1335248" y="1182540"/>
+                    <a:pt x="1820411" y="1136401"/>
+                    <a:pt x="2021747" y="1154577"/>
+                  </a:cubicBezTo>
+                </a:path>
+              </a:pathLst>
+            </a:custGeom>
+            <a:noFill/>
+            <a:ln w="28575">
+              <a:solidFill>
+                <a:schemeClr val="tx1"/>
+              </a:solidFill>
+            </a:ln>
+          </p:spPr>
+          <p:style>
+            <a:lnRef idx="2">
+              <a:schemeClr val="accent1">
+                <a:shade val="50000"/>
+              </a:schemeClr>
+            </a:lnRef>
+            <a:fillRef idx="1">
+              <a:schemeClr val="accent1"/>
+            </a:fillRef>
+            <a:effectRef idx="0">
+              <a:schemeClr val="accent1"/>
+            </a:effectRef>
+            <a:fontRef idx="minor">
+              <a:schemeClr val="lt1"/>
+            </a:fontRef>
+          </p:style>
+          <p:txBody>
+            <a:bodyPr rtlCol="0" anchor="ctr"/>
+            <a:lstStyle/>
+            <a:p>
+              <a:pPr algn="ctr"/>
+              <a:endParaRPr lang="es-CO"/>
+            </a:p>
+          </p:txBody>
+        </p:sp>
+      </p:grpSp>
+      <p:cxnSp>
+        <p:nvCxnSpPr>
+          <p:cNvPr id="35" name="Conector recto 34">
+            <a:extLst>
+              <a:ext uri="{FF2B5EF4-FFF2-40B4-BE49-F238E27FC236}">
+                <a16:creationId xmlns:a16="http://schemas.microsoft.com/office/drawing/2014/main" id="{F78386F1-6E41-48EF-B93A-595C732F232A}"/>
+              </a:ext>
+            </a:extLst>
+          </p:cNvPr>
+          <p:cNvCxnSpPr>
+            <a:stCxn id="29" idx="0"/>
+            <a:endCxn id="31" idx="0"/>
+          </p:cNvCxnSpPr>
+          <p:nvPr/>
+        </p:nvCxnSpPr>
+        <p:spPr>
+          <a:xfrm flipV="1">
+            <a:off x="2666997" y="3713535"/>
+            <a:ext cx="2509219" cy="1881"/>
+          </a:xfrm>
+          <a:prstGeom prst="line">
+            <a:avLst/>
+          </a:prstGeom>
+          <a:ln w="25400">
+            <a:solidFill>
+              <a:schemeClr val="tx1"/>
+            </a:solidFill>
+          </a:ln>
+        </p:spPr>
+        <p:style>
+          <a:lnRef idx="1">
+            <a:schemeClr val="accent1"/>
+          </a:lnRef>
+          <a:fillRef idx="0">
+            <a:schemeClr val="accent1"/>
+          </a:fillRef>
+          <a:effectRef idx="0">
+            <a:schemeClr val="accent1"/>
+          </a:effectRef>
+          <a:fontRef idx="minor">
+            <a:schemeClr val="tx1"/>
+          </a:fontRef>
+        </p:style>
+      </p:cxnSp>
+      <p:sp>
+        <p:nvSpPr>
+          <p:cNvPr id="36" name="CuadroTexto 35">
+            <a:extLst>
+              <a:ext uri="{FF2B5EF4-FFF2-40B4-BE49-F238E27FC236}">
+                <a16:creationId xmlns:a16="http://schemas.microsoft.com/office/drawing/2014/main" id="{7584F76C-D8D2-46D7-9D32-0F29EE396C9C}"/>
+              </a:ext>
+            </a:extLst>
+          </p:cNvPr>
+          <p:cNvSpPr txBox="1"/>
+          <p:nvPr/>
+        </p:nvSpPr>
+        <p:spPr>
+          <a:xfrm rot="16200000">
+            <a:off x="626839" y="4247535"/>
+            <a:ext cx="670376" cy="369332"/>
+          </a:xfrm>
+          <a:prstGeom prst="rect">
+            <a:avLst/>
+          </a:prstGeom>
+          <a:noFill/>
+        </p:spPr>
+        <p:txBody>
+          <a:bodyPr wrap="none" rtlCol="0">
+            <a:spAutoFit/>
+          </a:bodyPr>
+          <a:lstStyle/>
+          <a:p>
+            <a:r>
+              <a:rPr lang="es-CO" dirty="0"/>
+              <a:t>Brillo</a:t>
+            </a:r>
+          </a:p>
+        </p:txBody>
+      </p:sp>
+      <p:sp>
+        <p:nvSpPr>
+          <p:cNvPr id="37" name="CuadroTexto 36">
+            <a:extLst>
+              <a:ext uri="{FF2B5EF4-FFF2-40B4-BE49-F238E27FC236}">
+                <a16:creationId xmlns:a16="http://schemas.microsoft.com/office/drawing/2014/main" id="{79999FF7-DD5C-42EF-B8A1-D7087A67CBED}"/>
+              </a:ext>
+            </a:extLst>
+          </p:cNvPr>
+          <p:cNvSpPr txBox="1"/>
+          <p:nvPr/>
+        </p:nvSpPr>
+        <p:spPr>
+          <a:xfrm>
+            <a:off x="3465295" y="5475287"/>
+            <a:ext cx="912622" cy="369332"/>
+          </a:xfrm>
+          <a:prstGeom prst="rect">
+            <a:avLst/>
+          </a:prstGeom>
+          <a:noFill/>
+        </p:spPr>
+        <p:txBody>
+          <a:bodyPr wrap="none" rtlCol="0">
+            <a:spAutoFit/>
+          </a:bodyPr>
+          <a:lstStyle/>
+          <a:p>
+            <a:r>
+              <a:rPr lang="es-CO" dirty="0"/>
+              <a:t>Periodo</a:t>
+            </a:r>
+          </a:p>
+        </p:txBody>
+      </p:sp>
+      <p:cxnSp>
+        <p:nvCxnSpPr>
+          <p:cNvPr id="39" name="Conector recto de flecha 38">
+            <a:extLst>
+              <a:ext uri="{FF2B5EF4-FFF2-40B4-BE49-F238E27FC236}">
+                <a16:creationId xmlns:a16="http://schemas.microsoft.com/office/drawing/2014/main" id="{7B505C16-66B4-45C7-A1B5-525A800D66CC}"/>
+              </a:ext>
+            </a:extLst>
+          </p:cNvPr>
+          <p:cNvCxnSpPr/>
+          <p:nvPr/>
+        </p:nvCxnSpPr>
+        <p:spPr>
+          <a:xfrm>
+            <a:off x="1943221" y="5505450"/>
+            <a:ext cx="4026024" cy="0"/>
+          </a:xfrm>
+          <a:prstGeom prst="straightConnector1">
+            <a:avLst/>
+          </a:prstGeom>
+          <a:ln w="25400">
+            <a:solidFill>
+              <a:schemeClr val="tx1">
+                <a:lumMod val="50000"/>
+                <a:lumOff val="50000"/>
+              </a:schemeClr>
+            </a:solidFill>
+            <a:headEnd type="triangle"/>
+            <a:tailEnd type="triangle"/>
+          </a:ln>
+        </p:spPr>
+        <p:style>
+          <a:lnRef idx="1">
+            <a:schemeClr val="accent1"/>
+          </a:lnRef>
+          <a:fillRef idx="0">
+            <a:schemeClr val="accent1"/>
+          </a:fillRef>
+          <a:effectRef idx="0">
+            <a:schemeClr val="accent1"/>
+          </a:effectRef>
+          <a:fontRef idx="minor">
+            <a:schemeClr val="tx1"/>
+          </a:fontRef>
+        </p:style>
+      </p:cxnSp>
+    </p:spTree>
+    <p:extLst>
+      <p:ext uri="{BB962C8B-B14F-4D97-AF65-F5344CB8AC3E}">
+        <p14:creationId xmlns:p14="http://schemas.microsoft.com/office/powerpoint/2010/main" val="2282792077"/>
+      </p:ext>
+    </p:extLst>
+  </p:cSld>
+  <p:clrMapOvr>
+    <a:masterClrMapping/>
+  </p:clrMapOvr>
+</p:sld>
+</file>
+
 <file path=ppt/theme/theme1.xml><?xml version="1.0" encoding="utf-8"?>
 <a:theme xmlns:a="http://schemas.openxmlformats.org/drawingml/2006/main" name="Tema de Office">
   <a:themeElements>

</xml_diff>